<commit_message>
fixed glm predict() for AG veg.
</commit_message>
<xml_diff>
--- a/code_output.pptx
+++ b/code_output.pptx
@@ -12,6 +12,9 @@
     <p:sldId id="263" r:id="rId9"/>
     <p:sldId id="265" r:id="rId10"/>
     <p:sldId id="266" r:id="rId11"/>
+    <p:sldId id="269" r:id="rId12"/>
+    <p:sldId id="267" r:id="rId13"/>
+    <p:sldId id="268" r:id="rId14"/>
   </p:sldIdLst>
   <p:sldSz cx="12192000" cy="6858000"/>
   <p:notesSz cx="6858000" cy="9144000"/>
@@ -110,6 +113,11 @@
       </a:defRPr>
     </a:lvl9pPr>
   </p:defaultTextStyle>
+  <p:extLst>
+    <p:ext uri="{EFAFB233-063F-42B5-8137-9DF3F51BA10A}">
+      <p15:sldGuideLst xmlns:p15="http://schemas.microsoft.com/office/powerpoint/2012/main"/>
+    </p:ext>
+  </p:extLst>
 </p:presentation>
 </file>
 
@@ -117,11 +125,71 @@
 <pc:chgInfo xmlns:a="http://schemas.openxmlformats.org/drawingml/2006/main" xmlns:r="http://schemas.openxmlformats.org/officeDocument/2006/relationships" xmlns:ac="http://schemas.microsoft.com/office/drawing/2013/main/command" xmlns:pc="http://schemas.microsoft.com/office/powerpoint/2013/main/command">
   <pc:docChgLst>
     <pc:chgData name="Lane, Stefanie" userId="4a8c6c9c-e558-4387-bb26-bde8015993b6" providerId="ADAL" clId="{57E403F5-BD30-4B6D-B9C7-4ADF5389E353}"/>
-    <pc:docChg chg="custSel addSld modSld">
-      <pc:chgData name="Lane, Stefanie" userId="4a8c6c9c-e558-4387-bb26-bde8015993b6" providerId="ADAL" clId="{57E403F5-BD30-4B6D-B9C7-4ADF5389E353}" dt="2022-10-28T01:24:07.099" v="292" actId="1076"/>
+    <pc:docChg chg="undo custSel addSld modSld">
+      <pc:chgData name="Lane, Stefanie" userId="4a8c6c9c-e558-4387-bb26-bde8015993b6" providerId="ADAL" clId="{57E403F5-BD30-4B6D-B9C7-4ADF5389E353}" dt="2022-10-28T22:43:06.319" v="939" actId="207"/>
       <pc:docMkLst>
         <pc:docMk/>
       </pc:docMkLst>
+      <pc:sldChg chg="modSp">
+        <pc:chgData name="Lane, Stefanie" userId="4a8c6c9c-e558-4387-bb26-bde8015993b6" providerId="ADAL" clId="{57E403F5-BD30-4B6D-B9C7-4ADF5389E353}" dt="2022-10-28T22:42:52.053" v="936" actId="207"/>
+        <pc:sldMkLst>
+          <pc:docMk/>
+          <pc:sldMk cId="1357108148" sldId="260"/>
+        </pc:sldMkLst>
+        <pc:spChg chg="mod">
+          <ac:chgData name="Lane, Stefanie" userId="4a8c6c9c-e558-4387-bb26-bde8015993b6" providerId="ADAL" clId="{57E403F5-BD30-4B6D-B9C7-4ADF5389E353}" dt="2022-10-28T22:42:52.053" v="936" actId="207"/>
+          <ac:spMkLst>
+            <pc:docMk/>
+            <pc:sldMk cId="1357108148" sldId="260"/>
+            <ac:spMk id="6" creationId="{F7A090DE-BD2B-47FF-A170-5C99390278B2}"/>
+          </ac:spMkLst>
+        </pc:spChg>
+      </pc:sldChg>
+      <pc:sldChg chg="modSp">
+        <pc:chgData name="Lane, Stefanie" userId="4a8c6c9c-e558-4387-bb26-bde8015993b6" providerId="ADAL" clId="{57E403F5-BD30-4B6D-B9C7-4ADF5389E353}" dt="2022-10-28T22:42:56.245" v="937" actId="207"/>
+        <pc:sldMkLst>
+          <pc:docMk/>
+          <pc:sldMk cId="3551481397" sldId="261"/>
+        </pc:sldMkLst>
+        <pc:spChg chg="mod">
+          <ac:chgData name="Lane, Stefanie" userId="4a8c6c9c-e558-4387-bb26-bde8015993b6" providerId="ADAL" clId="{57E403F5-BD30-4B6D-B9C7-4ADF5389E353}" dt="2022-10-28T22:42:56.245" v="937" actId="207"/>
+          <ac:spMkLst>
+            <pc:docMk/>
+            <pc:sldMk cId="3551481397" sldId="261"/>
+            <ac:spMk id="6" creationId="{E226B57D-4BF1-4F22-98BD-FD0307336F3A}"/>
+          </ac:spMkLst>
+        </pc:spChg>
+      </pc:sldChg>
+      <pc:sldChg chg="modSp">
+        <pc:chgData name="Lane, Stefanie" userId="4a8c6c9c-e558-4387-bb26-bde8015993b6" providerId="ADAL" clId="{57E403F5-BD30-4B6D-B9C7-4ADF5389E353}" dt="2022-10-28T22:43:02.281" v="938" actId="207"/>
+        <pc:sldMkLst>
+          <pc:docMk/>
+          <pc:sldMk cId="1659934246" sldId="262"/>
+        </pc:sldMkLst>
+        <pc:spChg chg="mod">
+          <ac:chgData name="Lane, Stefanie" userId="4a8c6c9c-e558-4387-bb26-bde8015993b6" providerId="ADAL" clId="{57E403F5-BD30-4B6D-B9C7-4ADF5389E353}" dt="2022-10-28T22:43:02.281" v="938" actId="207"/>
+          <ac:spMkLst>
+            <pc:docMk/>
+            <pc:sldMk cId="1659934246" sldId="262"/>
+            <ac:spMk id="6" creationId="{9439C708-CAB7-4DE2-AE75-07E8F62C7B33}"/>
+          </ac:spMkLst>
+        </pc:spChg>
+      </pc:sldChg>
+      <pc:sldChg chg="modSp">
+        <pc:chgData name="Lane, Stefanie" userId="4a8c6c9c-e558-4387-bb26-bde8015993b6" providerId="ADAL" clId="{57E403F5-BD30-4B6D-B9C7-4ADF5389E353}" dt="2022-10-28T22:43:06.319" v="939" actId="207"/>
+        <pc:sldMkLst>
+          <pc:docMk/>
+          <pc:sldMk cId="1318038477" sldId="263"/>
+        </pc:sldMkLst>
+        <pc:spChg chg="mod">
+          <ac:chgData name="Lane, Stefanie" userId="4a8c6c9c-e558-4387-bb26-bde8015993b6" providerId="ADAL" clId="{57E403F5-BD30-4B6D-B9C7-4ADF5389E353}" dt="2022-10-28T22:43:06.319" v="939" actId="207"/>
+          <ac:spMkLst>
+            <pc:docMk/>
+            <pc:sldMk cId="1318038477" sldId="263"/>
+            <ac:spMk id="6" creationId="{769B52BC-74AF-41D1-8A2D-D95FD579FF6C}"/>
+          </ac:spMkLst>
+        </pc:spChg>
+      </pc:sldChg>
       <pc:sldChg chg="addSp delSp modSp add">
         <pc:chgData name="Lane, Stefanie" userId="4a8c6c9c-e558-4387-bb26-bde8015993b6" providerId="ADAL" clId="{57E403F5-BD30-4B6D-B9C7-4ADF5389E353}" dt="2022-10-28T01:24:07.099" v="292" actId="1076"/>
         <pc:sldMkLst>
@@ -241,17 +309,25 @@
         </pc:cxnChg>
       </pc:sldChg>
       <pc:sldChg chg="addSp delSp modSp add">
-        <pc:chgData name="Lane, Stefanie" userId="4a8c6c9c-e558-4387-bb26-bde8015993b6" providerId="ADAL" clId="{57E403F5-BD30-4B6D-B9C7-4ADF5389E353}" dt="2022-10-28T01:13:58.322" v="256" actId="20577"/>
+        <pc:chgData name="Lane, Stefanie" userId="4a8c6c9c-e558-4387-bb26-bde8015993b6" providerId="ADAL" clId="{57E403F5-BD30-4B6D-B9C7-4ADF5389E353}" dt="2022-10-28T22:42:31.693" v="935" actId="6549"/>
         <pc:sldMkLst>
           <pc:docMk/>
           <pc:sldMk cId="4095261651" sldId="266"/>
         </pc:sldMkLst>
-        <pc:spChg chg="add">
-          <ac:chgData name="Lane, Stefanie" userId="4a8c6c9c-e558-4387-bb26-bde8015993b6" providerId="ADAL" clId="{57E403F5-BD30-4B6D-B9C7-4ADF5389E353}" dt="2022-10-28T01:06:41.027" v="114"/>
+        <pc:spChg chg="add mod">
+          <ac:chgData name="Lane, Stefanie" userId="4a8c6c9c-e558-4387-bb26-bde8015993b6" providerId="ADAL" clId="{57E403F5-BD30-4B6D-B9C7-4ADF5389E353}" dt="2022-10-28T21:50:41.645" v="767" actId="164"/>
           <ac:spMkLst>
             <pc:docMk/>
             <pc:sldMk cId="4095261651" sldId="266"/>
             <ac:spMk id="2" creationId="{6B822042-6792-4A75-AB34-82434483F276}"/>
+          </ac:spMkLst>
+        </pc:spChg>
+        <pc:spChg chg="add mod">
+          <ac:chgData name="Lane, Stefanie" userId="4a8c6c9c-e558-4387-bb26-bde8015993b6" providerId="ADAL" clId="{57E403F5-BD30-4B6D-B9C7-4ADF5389E353}" dt="2022-10-28T22:42:31.693" v="935" actId="6549"/>
+          <ac:spMkLst>
+            <pc:docMk/>
+            <pc:sldMk cId="4095261651" sldId="266"/>
+            <ac:spMk id="3" creationId="{0BCE1DC7-36F4-495B-90FF-F42962D5F62B}"/>
           </ac:spMkLst>
         </pc:spChg>
         <pc:spChg chg="add del mod">
@@ -263,7 +339,7 @@
           </ac:spMkLst>
         </pc:spChg>
         <pc:spChg chg="add mod">
-          <ac:chgData name="Lane, Stefanie" userId="4a8c6c9c-e558-4387-bb26-bde8015993b6" providerId="ADAL" clId="{57E403F5-BD30-4B6D-B9C7-4ADF5389E353}" dt="2022-10-28T01:11:52.489" v="195" actId="208"/>
+          <ac:chgData name="Lane, Stefanie" userId="4a8c6c9c-e558-4387-bb26-bde8015993b6" providerId="ADAL" clId="{57E403F5-BD30-4B6D-B9C7-4ADF5389E353}" dt="2022-10-28T21:50:41.645" v="767" actId="164"/>
           <ac:spMkLst>
             <pc:docMk/>
             <pc:sldMk cId="4095261651" sldId="266"/>
@@ -271,7 +347,7 @@
           </ac:spMkLst>
         </pc:spChg>
         <pc:spChg chg="add mod">
-          <ac:chgData name="Lane, Stefanie" userId="4a8c6c9c-e558-4387-bb26-bde8015993b6" providerId="ADAL" clId="{57E403F5-BD30-4B6D-B9C7-4ADF5389E353}" dt="2022-10-28T01:13:43.984" v="234" actId="1076"/>
+          <ac:chgData name="Lane, Stefanie" userId="4a8c6c9c-e558-4387-bb26-bde8015993b6" providerId="ADAL" clId="{57E403F5-BD30-4B6D-B9C7-4ADF5389E353}" dt="2022-10-28T21:50:44.973" v="768" actId="164"/>
           <ac:spMkLst>
             <pc:docMk/>
             <pc:sldMk cId="4095261651" sldId="266"/>
@@ -279,13 +355,29 @@
           </ac:spMkLst>
         </pc:spChg>
         <pc:spChg chg="add mod">
-          <ac:chgData name="Lane, Stefanie" userId="4a8c6c9c-e558-4387-bb26-bde8015993b6" providerId="ADAL" clId="{57E403F5-BD30-4B6D-B9C7-4ADF5389E353}" dt="2022-10-28T01:13:58.322" v="256" actId="20577"/>
+          <ac:chgData name="Lane, Stefanie" userId="4a8c6c9c-e558-4387-bb26-bde8015993b6" providerId="ADAL" clId="{57E403F5-BD30-4B6D-B9C7-4ADF5389E353}" dt="2022-10-28T21:50:44.973" v="768" actId="164"/>
           <ac:spMkLst>
             <pc:docMk/>
             <pc:sldMk cId="4095261651" sldId="266"/>
             <ac:spMk id="10" creationId="{AF9CA1F9-0F2A-4026-8AFB-722BCCF36044}"/>
           </ac:spMkLst>
         </pc:spChg>
+        <pc:grpChg chg="add mod">
+          <ac:chgData name="Lane, Stefanie" userId="4a8c6c9c-e558-4387-bb26-bde8015993b6" providerId="ADAL" clId="{57E403F5-BD30-4B6D-B9C7-4ADF5389E353}" dt="2022-10-28T21:50:44.973" v="768" actId="164"/>
+          <ac:grpSpMkLst>
+            <pc:docMk/>
+            <pc:sldMk cId="4095261651" sldId="266"/>
+            <ac:grpSpMk id="6" creationId="{B266460E-BEF5-4F03-A3ED-5DD9094B0165}"/>
+          </ac:grpSpMkLst>
+        </pc:grpChg>
+        <pc:grpChg chg="add mod">
+          <ac:chgData name="Lane, Stefanie" userId="4a8c6c9c-e558-4387-bb26-bde8015993b6" providerId="ADAL" clId="{57E403F5-BD30-4B6D-B9C7-4ADF5389E353}" dt="2022-10-28T21:50:44.973" v="768" actId="164"/>
+          <ac:grpSpMkLst>
+            <pc:docMk/>
+            <pc:sldMk cId="4095261651" sldId="266"/>
+            <ac:grpSpMk id="11" creationId="{D28F8D20-A68F-445B-BA75-1C86301BFBF2}"/>
+          </ac:grpSpMkLst>
+        </pc:grpChg>
         <pc:picChg chg="add del mod modCrop">
           <ac:chgData name="Lane, Stefanie" userId="4a8c6c9c-e558-4387-bb26-bde8015993b6" providerId="ADAL" clId="{57E403F5-BD30-4B6D-B9C7-4ADF5389E353}" dt="2022-10-28T01:09:47.460" v="129" actId="478"/>
           <ac:picMkLst>
@@ -295,7 +387,7 @@
           </ac:picMkLst>
         </pc:picChg>
         <pc:picChg chg="add mod ord">
-          <ac:chgData name="Lane, Stefanie" userId="4a8c6c9c-e558-4387-bb26-bde8015993b6" providerId="ADAL" clId="{57E403F5-BD30-4B6D-B9C7-4ADF5389E353}" dt="2022-10-28T01:13:14.623" v="199" actId="14826"/>
+          <ac:chgData name="Lane, Stefanie" userId="4a8c6c9c-e558-4387-bb26-bde8015993b6" providerId="ADAL" clId="{57E403F5-BD30-4B6D-B9C7-4ADF5389E353}" dt="2022-10-28T21:50:41.645" v="767" actId="164"/>
           <ac:picMkLst>
             <pc:docMk/>
             <pc:sldMk cId="4095261651" sldId="266"/>
@@ -303,7 +395,7 @@
           </ac:picMkLst>
         </pc:picChg>
         <pc:picChg chg="add mod ord modCrop">
-          <ac:chgData name="Lane, Stefanie" userId="4a8c6c9c-e558-4387-bb26-bde8015993b6" providerId="ADAL" clId="{57E403F5-BD30-4B6D-B9C7-4ADF5389E353}" dt="2022-10-28T01:11:06.363" v="185" actId="1035"/>
+          <ac:chgData name="Lane, Stefanie" userId="4a8c6c9c-e558-4387-bb26-bde8015993b6" providerId="ADAL" clId="{57E403F5-BD30-4B6D-B9C7-4ADF5389E353}" dt="2022-10-28T21:50:41.645" v="767" actId="164"/>
           <ac:picMkLst>
             <pc:docMk/>
             <pc:sldMk cId="4095261651" sldId="266"/>
@@ -311,13 +403,66 @@
           </ac:picMkLst>
         </pc:picChg>
         <pc:picChg chg="add mod ord modCrop">
-          <ac:chgData name="Lane, Stefanie" userId="4a8c6c9c-e558-4387-bb26-bde8015993b6" providerId="ADAL" clId="{57E403F5-BD30-4B6D-B9C7-4ADF5389E353}" dt="2022-10-28T01:11:56.755" v="197" actId="1076"/>
+          <ac:chgData name="Lane, Stefanie" userId="4a8c6c9c-e558-4387-bb26-bde8015993b6" providerId="ADAL" clId="{57E403F5-BD30-4B6D-B9C7-4ADF5389E353}" dt="2022-10-28T21:50:41.645" v="767" actId="164"/>
           <ac:picMkLst>
             <pc:docMk/>
             <pc:sldMk cId="4095261651" sldId="266"/>
             <ac:picMk id="7" creationId="{2D213856-9B43-4A2C-9402-28D5782E0DA1}"/>
           </ac:picMkLst>
         </pc:picChg>
+      </pc:sldChg>
+      <pc:sldChg chg="addSp modSp add">
+        <pc:chgData name="Lane, Stefanie" userId="4a8c6c9c-e558-4387-bb26-bde8015993b6" providerId="ADAL" clId="{57E403F5-BD30-4B6D-B9C7-4ADF5389E353}" dt="2022-10-28T19:09:36.603" v="298" actId="14100"/>
+        <pc:sldMkLst>
+          <pc:docMk/>
+          <pc:sldMk cId="3812361324" sldId="267"/>
+        </pc:sldMkLst>
+        <pc:picChg chg="add mod">
+          <ac:chgData name="Lane, Stefanie" userId="4a8c6c9c-e558-4387-bb26-bde8015993b6" providerId="ADAL" clId="{57E403F5-BD30-4B6D-B9C7-4ADF5389E353}" dt="2022-10-28T19:09:36.603" v="298" actId="14100"/>
+          <ac:picMkLst>
+            <pc:docMk/>
+            <pc:sldMk cId="3812361324" sldId="267"/>
+            <ac:picMk id="2" creationId="{3CC23500-4637-4F68-9D77-A9CE3B390AC6}"/>
+          </ac:picMkLst>
+        </pc:picChg>
+      </pc:sldChg>
+      <pc:sldChg chg="addSp add">
+        <pc:chgData name="Lane, Stefanie" userId="4a8c6c9c-e558-4387-bb26-bde8015993b6" providerId="ADAL" clId="{57E403F5-BD30-4B6D-B9C7-4ADF5389E353}" dt="2022-10-28T19:09:46.234" v="300"/>
+        <pc:sldMkLst>
+          <pc:docMk/>
+          <pc:sldMk cId="2290328964" sldId="268"/>
+        </pc:sldMkLst>
+        <pc:picChg chg="add">
+          <ac:chgData name="Lane, Stefanie" userId="4a8c6c9c-e558-4387-bb26-bde8015993b6" providerId="ADAL" clId="{57E403F5-BD30-4B6D-B9C7-4ADF5389E353}" dt="2022-10-28T19:09:46.234" v="300"/>
+          <ac:picMkLst>
+            <pc:docMk/>
+            <pc:sldMk cId="2290328964" sldId="268"/>
+            <ac:picMk id="2" creationId="{106F5332-D03B-4901-8B90-228537181191}"/>
+          </ac:picMkLst>
+        </pc:picChg>
+      </pc:sldChg>
+      <pc:sldChg chg="modSp add">
+        <pc:chgData name="Lane, Stefanie" userId="4a8c6c9c-e558-4387-bb26-bde8015993b6" providerId="ADAL" clId="{57E403F5-BD30-4B6D-B9C7-4ADF5389E353}" dt="2022-10-28T22:11:01.382" v="933" actId="20577"/>
+        <pc:sldMkLst>
+          <pc:docMk/>
+          <pc:sldMk cId="3190414420" sldId="269"/>
+        </pc:sldMkLst>
+        <pc:spChg chg="mod">
+          <ac:chgData name="Lane, Stefanie" userId="4a8c6c9c-e558-4387-bb26-bde8015993b6" providerId="ADAL" clId="{57E403F5-BD30-4B6D-B9C7-4ADF5389E353}" dt="2022-10-28T19:10:21.093" v="444" actId="20577"/>
+          <ac:spMkLst>
+            <pc:docMk/>
+            <pc:sldMk cId="3190414420" sldId="269"/>
+            <ac:spMk id="2" creationId="{257A197C-91C0-4A6D-B2B6-40FD7C2A9CCD}"/>
+          </ac:spMkLst>
+        </pc:spChg>
+        <pc:spChg chg="mod">
+          <ac:chgData name="Lane, Stefanie" userId="4a8c6c9c-e558-4387-bb26-bde8015993b6" providerId="ADAL" clId="{57E403F5-BD30-4B6D-B9C7-4ADF5389E353}" dt="2022-10-28T22:11:01.382" v="933" actId="20577"/>
+          <ac:spMkLst>
+            <pc:docMk/>
+            <pc:sldMk cId="3190414420" sldId="269"/>
+            <ac:spMk id="3" creationId="{36A330B7-CA59-4BEB-988B-8CA4B035569E}"/>
+          </ac:spMkLst>
+        </pc:spChg>
       </pc:sldChg>
     </pc:docChg>
   </pc:docChgLst>
@@ -471,7 +616,7 @@
           <a:p>
             <a:fld id="{22CD44A9-BD90-44AE-81F7-965A00CBDE3A}" type="datetimeFigureOut">
               <a:rPr lang="en-US" smtClean="0"/>
-              <a:t>10/27/2022</a:t>
+              <a:t>10/28/2022</a:t>
             </a:fld>
             <a:endParaRPr lang="en-US"/>
           </a:p>
@@ -669,7 +814,7 @@
           <a:p>
             <a:fld id="{22CD44A9-BD90-44AE-81F7-965A00CBDE3A}" type="datetimeFigureOut">
               <a:rPr lang="en-US" smtClean="0"/>
-              <a:t>10/27/2022</a:t>
+              <a:t>10/28/2022</a:t>
             </a:fld>
             <a:endParaRPr lang="en-US"/>
           </a:p>
@@ -877,7 +1022,7 @@
           <a:p>
             <a:fld id="{22CD44A9-BD90-44AE-81F7-965A00CBDE3A}" type="datetimeFigureOut">
               <a:rPr lang="en-US" smtClean="0"/>
-              <a:t>10/27/2022</a:t>
+              <a:t>10/28/2022</a:t>
             </a:fld>
             <a:endParaRPr lang="en-US"/>
           </a:p>
@@ -1075,7 +1220,7 @@
           <a:p>
             <a:fld id="{22CD44A9-BD90-44AE-81F7-965A00CBDE3A}" type="datetimeFigureOut">
               <a:rPr lang="en-US" smtClean="0"/>
-              <a:t>10/27/2022</a:t>
+              <a:t>10/28/2022</a:t>
             </a:fld>
             <a:endParaRPr lang="en-US"/>
           </a:p>
@@ -1350,7 +1495,7 @@
           <a:p>
             <a:fld id="{22CD44A9-BD90-44AE-81F7-965A00CBDE3A}" type="datetimeFigureOut">
               <a:rPr lang="en-US" smtClean="0"/>
-              <a:t>10/27/2022</a:t>
+              <a:t>10/28/2022</a:t>
             </a:fld>
             <a:endParaRPr lang="en-US"/>
           </a:p>
@@ -1615,7 +1760,7 @@
           <a:p>
             <a:fld id="{22CD44A9-BD90-44AE-81F7-965A00CBDE3A}" type="datetimeFigureOut">
               <a:rPr lang="en-US" smtClean="0"/>
-              <a:t>10/27/2022</a:t>
+              <a:t>10/28/2022</a:t>
             </a:fld>
             <a:endParaRPr lang="en-US"/>
           </a:p>
@@ -2027,7 +2172,7 @@
           <a:p>
             <a:fld id="{22CD44A9-BD90-44AE-81F7-965A00CBDE3A}" type="datetimeFigureOut">
               <a:rPr lang="en-US" smtClean="0"/>
-              <a:t>10/27/2022</a:t>
+              <a:t>10/28/2022</a:t>
             </a:fld>
             <a:endParaRPr lang="en-US"/>
           </a:p>
@@ -2168,7 +2313,7 @@
           <a:p>
             <a:fld id="{22CD44A9-BD90-44AE-81F7-965A00CBDE3A}" type="datetimeFigureOut">
               <a:rPr lang="en-US" smtClean="0"/>
-              <a:t>10/27/2022</a:t>
+              <a:t>10/28/2022</a:t>
             </a:fld>
             <a:endParaRPr lang="en-US"/>
           </a:p>
@@ -2281,7 +2426,7 @@
           <a:p>
             <a:fld id="{22CD44A9-BD90-44AE-81F7-965A00CBDE3A}" type="datetimeFigureOut">
               <a:rPr lang="en-US" smtClean="0"/>
-              <a:t>10/27/2022</a:t>
+              <a:t>10/28/2022</a:t>
             </a:fld>
             <a:endParaRPr lang="en-US"/>
           </a:p>
@@ -2592,7 +2737,7 @@
           <a:p>
             <a:fld id="{22CD44A9-BD90-44AE-81F7-965A00CBDE3A}" type="datetimeFigureOut">
               <a:rPr lang="en-US" smtClean="0"/>
-              <a:t>10/27/2022</a:t>
+              <a:t>10/28/2022</a:t>
             </a:fld>
             <a:endParaRPr lang="en-US"/>
           </a:p>
@@ -2880,7 +3025,7 @@
           <a:p>
             <a:fld id="{22CD44A9-BD90-44AE-81F7-965A00CBDE3A}" type="datetimeFigureOut">
               <a:rPr lang="en-US" smtClean="0"/>
-              <a:t>10/27/2022</a:t>
+              <a:t>10/28/2022</a:t>
             </a:fld>
             <a:endParaRPr lang="en-US"/>
           </a:p>
@@ -3121,7 +3266,7 @@
           <a:p>
             <a:fld id="{22CD44A9-BD90-44AE-81F7-965A00CBDE3A}" type="datetimeFigureOut">
               <a:rPr lang="en-US" smtClean="0"/>
-              <a:t>10/27/2022</a:t>
+              <a:t>10/28/2022</a:t>
             </a:fld>
             <a:endParaRPr lang="en-US"/>
           </a:p>
@@ -3678,7 +3823,9 @@
           <a:prstGeom prst="rect">
             <a:avLst/>
           </a:prstGeom>
-          <a:noFill/>
+          <a:solidFill>
+            <a:schemeClr val="accent4"/>
+          </a:solidFill>
         </p:spPr>
         <p:txBody>
           <a:bodyPr wrap="square" rtlCol="0">
@@ -3701,6 +3848,66 @@
     <p:extLst>
       <p:ext uri="{BB962C8B-B14F-4D97-AF65-F5344CB8AC3E}">
         <p14:creationId xmlns:p14="http://schemas.microsoft.com/office/powerpoint/2010/main" val="1357108148"/>
+      </p:ext>
+    </p:extLst>
+  </p:cSld>
+  <p:clrMapOvr>
+    <a:masterClrMapping/>
+  </p:clrMapOvr>
+</p:sld>
+</file>
+
+<file path=ppt/slides/slide10.xml><?xml version="1.0" encoding="utf-8"?>
+<p:sld xmlns:a="http://schemas.openxmlformats.org/drawingml/2006/main" xmlns:r="http://schemas.openxmlformats.org/officeDocument/2006/relationships" xmlns:p="http://schemas.openxmlformats.org/presentationml/2006/main">
+  <p:cSld>
+    <p:spTree>
+      <p:nvGrpSpPr>
+        <p:cNvPr id="1" name=""/>
+        <p:cNvGrpSpPr/>
+        <p:nvPr/>
+      </p:nvGrpSpPr>
+      <p:grpSpPr>
+        <a:xfrm>
+          <a:off x="0" y="0"/>
+          <a:ext cx="0" cy="0"/>
+          <a:chOff x="0" y="0"/>
+          <a:chExt cx="0" cy="0"/>
+        </a:xfrm>
+      </p:grpSpPr>
+      <p:pic>
+        <p:nvPicPr>
+          <p:cNvPr id="2" name="Picture 1">
+            <a:extLst>
+              <a:ext uri="{FF2B5EF4-FFF2-40B4-BE49-F238E27FC236}">
+                <a16:creationId xmlns:a16="http://schemas.microsoft.com/office/drawing/2014/main" id="{106F5332-D03B-4901-8B90-228537181191}"/>
+              </a:ext>
+            </a:extLst>
+          </p:cNvPr>
+          <p:cNvPicPr>
+            <a:picLocks noChangeAspect="1"/>
+          </p:cNvPicPr>
+          <p:nvPr/>
+        </p:nvPicPr>
+        <p:blipFill>
+          <a:blip r:embed="rId2"/>
+          <a:stretch>
+            <a:fillRect/>
+          </a:stretch>
+        </p:blipFill>
+        <p:spPr>
+          <a:xfrm>
+            <a:off x="810310" y="136874"/>
+            <a:ext cx="10571380" cy="6584251"/>
+          </a:xfrm>
+          <a:prstGeom prst="rect">
+            <a:avLst/>
+          </a:prstGeom>
+        </p:spPr>
+      </p:pic>
+    </p:spTree>
+    <p:extLst>
+      <p:ext uri="{BB962C8B-B14F-4D97-AF65-F5344CB8AC3E}">
+        <p14:creationId xmlns:p14="http://schemas.microsoft.com/office/powerpoint/2010/main" val="2290328964"/>
       </p:ext>
     </p:extLst>
   </p:cSld>
@@ -3867,7 +4074,9 @@
           <a:prstGeom prst="rect">
             <a:avLst/>
           </a:prstGeom>
-          <a:noFill/>
+          <a:solidFill>
+            <a:schemeClr val="accent4"/>
+          </a:solidFill>
         </p:spPr>
         <p:txBody>
           <a:bodyPr wrap="square" rtlCol="0">
@@ -4323,7 +4532,9 @@
           <a:prstGeom prst="rect">
             <a:avLst/>
           </a:prstGeom>
-          <a:noFill/>
+          <a:solidFill>
+            <a:schemeClr val="accent4"/>
+          </a:solidFill>
         </p:spPr>
         <p:txBody>
           <a:bodyPr wrap="square" rtlCol="0">
@@ -4512,7 +4723,9 @@
           <a:prstGeom prst="rect">
             <a:avLst/>
           </a:prstGeom>
-          <a:noFill/>
+          <a:solidFill>
+            <a:schemeClr val="accent4"/>
+          </a:solidFill>
         </p:spPr>
         <p:txBody>
           <a:bodyPr wrap="square" rtlCol="0">
@@ -4828,57 +5041,487 @@
           <a:chExt cx="0" cy="0"/>
         </a:xfrm>
       </p:grpSpPr>
-      <p:sp>
-        <p:nvSpPr>
-          <p:cNvPr id="2" name="AutoShape 2" descr="http://127.0.0.1:52687/graphics/5d5344c8-2220-422c-abbf-b140618336ab.png">
-            <a:extLst>
-              <a:ext uri="{FF2B5EF4-FFF2-40B4-BE49-F238E27FC236}">
-                <a16:creationId xmlns:a16="http://schemas.microsoft.com/office/drawing/2014/main" id="{6B822042-6792-4A75-AB34-82434483F276}"/>
-              </a:ext>
-            </a:extLst>
-          </p:cNvPr>
-          <p:cNvSpPr>
-            <a:spLocks noChangeAspect="1" noChangeArrowheads="1"/>
-          </p:cNvSpPr>
+      <p:grpSp>
+        <p:nvGrpSpPr>
+          <p:cNvPr id="11" name="Group 10">
+            <a:extLst>
+              <a:ext uri="{FF2B5EF4-FFF2-40B4-BE49-F238E27FC236}">
+                <a16:creationId xmlns:a16="http://schemas.microsoft.com/office/drawing/2014/main" id="{D28F8D20-A68F-445B-BA75-1C86301BFBF2}"/>
+              </a:ext>
+            </a:extLst>
+          </p:cNvPr>
+          <p:cNvGrpSpPr/>
           <p:nvPr/>
-        </p:nvSpPr>
-        <p:spPr bwMode="auto">
+        </p:nvGrpSpPr>
+        <p:grpSpPr>
           <a:xfrm>
-            <a:off x="5943600" y="3276600"/>
-            <a:ext cx="304800" cy="304800"/>
+            <a:off x="2047495" y="437180"/>
+            <a:ext cx="6708315" cy="5936022"/>
+            <a:chOff x="2047495" y="437180"/>
+            <a:chExt cx="6708315" cy="5936022"/>
+          </a:xfrm>
+        </p:grpSpPr>
+        <p:grpSp>
+          <p:nvGrpSpPr>
+            <p:cNvPr id="6" name="Group 5">
+              <a:extLst>
+                <a:ext uri="{FF2B5EF4-FFF2-40B4-BE49-F238E27FC236}">
+                  <a16:creationId xmlns:a16="http://schemas.microsoft.com/office/drawing/2014/main" id="{B266460E-BEF5-4F03-A3ED-5DD9094B0165}"/>
+                </a:ext>
+              </a:extLst>
+            </p:cNvPr>
+            <p:cNvGrpSpPr/>
+            <p:nvPr/>
+          </p:nvGrpSpPr>
+          <p:grpSpPr>
+            <a:xfrm>
+              <a:off x="3527252" y="437180"/>
+              <a:ext cx="5228558" cy="5936022"/>
+              <a:chOff x="3527252" y="437180"/>
+              <a:chExt cx="5228558" cy="5936022"/>
+            </a:xfrm>
+          </p:grpSpPr>
+          <p:sp>
+            <p:nvSpPr>
+              <p:cNvPr id="2" name="AutoShape 2" descr="http://127.0.0.1:52687/graphics/5d5344c8-2220-422c-abbf-b140618336ab.png">
+                <a:extLst>
+                  <a:ext uri="{FF2B5EF4-FFF2-40B4-BE49-F238E27FC236}">
+                    <a16:creationId xmlns:a16="http://schemas.microsoft.com/office/drawing/2014/main" id="{6B822042-6792-4A75-AB34-82434483F276}"/>
+                  </a:ext>
+                </a:extLst>
+              </p:cNvPr>
+              <p:cNvSpPr>
+                <a:spLocks noChangeAspect="1" noChangeArrowheads="1"/>
+              </p:cNvSpPr>
+              <p:nvPr/>
+            </p:nvSpPr>
+            <p:spPr bwMode="auto">
+              <a:xfrm>
+                <a:off x="5943600" y="3276600"/>
+                <a:ext cx="304800" cy="304800"/>
+              </a:xfrm>
+              <a:prstGeom prst="rect">
+                <a:avLst/>
+              </a:prstGeom>
+              <a:noFill/>
+              <a:extLst>
+                <a:ext uri="{909E8E84-426E-40DD-AFC4-6F175D3DCCD1}">
+                  <a14:hiddenFill xmlns:a14="http://schemas.microsoft.com/office/drawing/2010/main">
+                    <a:solidFill>
+                      <a:srgbClr val="FFFFFF"/>
+                    </a:solidFill>
+                  </a14:hiddenFill>
+                </a:ext>
+              </a:extLst>
+            </p:spPr>
+            <p:txBody>
+              <a:bodyPr vert="horz" wrap="square" lIns="91440" tIns="45720" rIns="91440" bIns="45720" numCol="1" anchor="t" anchorCtr="0" compatLnSpc="1">
+                <a:prstTxWarp prst="textNoShape">
+                  <a:avLst/>
+                </a:prstTxWarp>
+              </a:bodyPr>
+              <a:lstStyle/>
+              <a:p>
+                <a:endParaRPr lang="en-US"/>
+              </a:p>
+            </p:txBody>
+          </p:sp>
+          <p:pic>
+            <p:nvPicPr>
+              <p:cNvPr id="4" name="Picture 3">
+                <a:extLst>
+                  <a:ext uri="{FF2B5EF4-FFF2-40B4-BE49-F238E27FC236}">
+                    <a16:creationId xmlns:a16="http://schemas.microsoft.com/office/drawing/2014/main" id="{28102C20-1E43-4652-9BD9-4B64D9479935}"/>
+                  </a:ext>
+                </a:extLst>
+              </p:cNvPr>
+              <p:cNvPicPr>
+                <a:picLocks noChangeAspect="1"/>
+              </p:cNvPicPr>
+              <p:nvPr/>
+            </p:nvPicPr>
+            <p:blipFill>
+              <a:blip r:embed="rId2">
+                <a:extLst>
+                  <a:ext uri="{28A0092B-C50C-407E-A947-70E740481C1C}">
+                    <a14:useLocalDpi xmlns:a14="http://schemas.microsoft.com/office/drawing/2010/main" val="0"/>
+                  </a:ext>
+                </a:extLst>
+              </a:blip>
+              <a:stretch>
+                <a:fillRect/>
+              </a:stretch>
+            </p:blipFill>
+            <p:spPr>
+              <a:xfrm>
+                <a:off x="3527253" y="437180"/>
+                <a:ext cx="4832695" cy="3292010"/>
+              </a:xfrm>
+              <a:prstGeom prst="rect">
+                <a:avLst/>
+              </a:prstGeom>
+            </p:spPr>
+          </p:pic>
+          <p:pic>
+            <p:nvPicPr>
+              <p:cNvPr id="5" name="Picture 4">
+                <a:extLst>
+                  <a:ext uri="{FF2B5EF4-FFF2-40B4-BE49-F238E27FC236}">
+                    <a16:creationId xmlns:a16="http://schemas.microsoft.com/office/drawing/2014/main" id="{96884535-290E-4E2B-8C4E-30AD247BB70E}"/>
+                  </a:ext>
+                </a:extLst>
+              </p:cNvPr>
+              <p:cNvPicPr>
+                <a:picLocks noChangeAspect="1"/>
+              </p:cNvPicPr>
+              <p:nvPr/>
+            </p:nvPicPr>
+            <p:blipFill rotWithShape="1">
+              <a:blip r:embed="rId3"/>
+              <a:srcRect t="6845"/>
+              <a:stretch/>
+            </p:blipFill>
+            <p:spPr>
+              <a:xfrm>
+                <a:off x="3527252" y="3306510"/>
+                <a:ext cx="4832696" cy="3066692"/>
+              </a:xfrm>
+              <a:prstGeom prst="rect">
+                <a:avLst/>
+              </a:prstGeom>
+            </p:spPr>
+          </p:pic>
+          <p:sp>
+            <p:nvSpPr>
+              <p:cNvPr id="8" name="Rectangle 7">
+                <a:extLst>
+                  <a:ext uri="{FF2B5EF4-FFF2-40B4-BE49-F238E27FC236}">
+                    <a16:creationId xmlns:a16="http://schemas.microsoft.com/office/drawing/2014/main" id="{3679A5F7-0039-4AC4-B822-27C6BDADC7EB}"/>
+                  </a:ext>
+                </a:extLst>
+              </p:cNvPr>
+              <p:cNvSpPr/>
+              <p:nvPr/>
+            </p:nvSpPr>
+            <p:spPr>
+              <a:xfrm>
+                <a:off x="7366958" y="1552755"/>
+                <a:ext cx="992990" cy="3795622"/>
+              </a:xfrm>
+              <a:prstGeom prst="rect">
+                <a:avLst/>
+              </a:prstGeom>
+              <a:solidFill>
+                <a:schemeClr val="bg1"/>
+              </a:solidFill>
+              <a:ln>
+                <a:solidFill>
+                  <a:schemeClr val="bg1"/>
+                </a:solidFill>
+              </a:ln>
+            </p:spPr>
+            <p:style>
+              <a:lnRef idx="2">
+                <a:schemeClr val="accent1">
+                  <a:shade val="50000"/>
+                </a:schemeClr>
+              </a:lnRef>
+              <a:fillRef idx="1">
+                <a:schemeClr val="accent1"/>
+              </a:fillRef>
+              <a:effectRef idx="0">
+                <a:schemeClr val="accent1"/>
+              </a:effectRef>
+              <a:fontRef idx="minor">
+                <a:schemeClr val="lt1"/>
+              </a:fontRef>
+            </p:style>
+            <p:txBody>
+              <a:bodyPr rtlCol="0" anchor="ctr"/>
+              <a:lstStyle/>
+              <a:p>
+                <a:pPr algn="ctr"/>
+                <a:endParaRPr lang="en-US"/>
+              </a:p>
+            </p:txBody>
+          </p:sp>
+          <p:pic>
+            <p:nvPicPr>
+              <p:cNvPr id="7" name="Picture 6">
+                <a:extLst>
+                  <a:ext uri="{FF2B5EF4-FFF2-40B4-BE49-F238E27FC236}">
+                    <a16:creationId xmlns:a16="http://schemas.microsoft.com/office/drawing/2014/main" id="{2D213856-9B43-4A2C-9402-28D5782E0DA1}"/>
+                  </a:ext>
+                </a:extLst>
+              </p:cNvPr>
+              <p:cNvPicPr>
+                <a:picLocks noChangeAspect="1"/>
+              </p:cNvPicPr>
+              <p:nvPr/>
+            </p:nvPicPr>
+            <p:blipFill rotWithShape="1">
+              <a:blip r:embed="rId3"/>
+              <a:srcRect l="77885" t="30961" r="1" b="38642"/>
+              <a:stretch/>
+            </p:blipFill>
+            <p:spPr>
+              <a:xfrm>
+                <a:off x="7687105" y="2905367"/>
+                <a:ext cx="1068705" cy="1000664"/>
+              </a:xfrm>
+              <a:prstGeom prst="rect">
+                <a:avLst/>
+              </a:prstGeom>
+            </p:spPr>
+          </p:pic>
+        </p:grpSp>
+        <p:sp>
+          <p:nvSpPr>
+            <p:cNvPr id="9" name="TextBox 8">
+              <a:extLst>
+                <a:ext uri="{FF2B5EF4-FFF2-40B4-BE49-F238E27FC236}">
+                  <a16:creationId xmlns:a16="http://schemas.microsoft.com/office/drawing/2014/main" id="{5CFCB7DB-33E8-4488-885C-888EAFB39141}"/>
+                </a:ext>
+              </a:extLst>
+            </p:cNvPr>
+            <p:cNvSpPr txBox="1"/>
+            <p:nvPr/>
+          </p:nvSpPr>
+          <p:spPr>
+            <a:xfrm>
+              <a:off x="2047495" y="1552755"/>
+              <a:ext cx="1481265" cy="923330"/>
+            </a:xfrm>
+            <a:prstGeom prst="rect">
+              <a:avLst/>
+            </a:prstGeom>
+            <a:noFill/>
+          </p:spPr>
+          <p:txBody>
+            <a:bodyPr wrap="square" rtlCol="0">
+              <a:spAutoFit/>
+            </a:bodyPr>
+            <a:lstStyle/>
+            <a:p>
+              <a:pPr algn="ctr"/>
+              <a:r>
+                <a:rPr lang="en-US" dirty="0"/>
+                <a:t>Above ground vegetation</a:t>
+              </a:r>
+            </a:p>
+          </p:txBody>
+        </p:sp>
+        <p:sp>
+          <p:nvSpPr>
+            <p:cNvPr id="10" name="TextBox 9">
+              <a:extLst>
+                <a:ext uri="{FF2B5EF4-FFF2-40B4-BE49-F238E27FC236}">
+                  <a16:creationId xmlns:a16="http://schemas.microsoft.com/office/drawing/2014/main" id="{AF9CA1F9-0F2A-4026-8AFB-722BCCF36044}"/>
+                </a:ext>
+              </a:extLst>
+            </p:cNvPr>
+            <p:cNvSpPr txBox="1"/>
+            <p:nvPr/>
+          </p:nvSpPr>
+          <p:spPr>
+            <a:xfrm>
+              <a:off x="2047495" y="4205250"/>
+              <a:ext cx="1481265" cy="646331"/>
+            </a:xfrm>
+            <a:prstGeom prst="rect">
+              <a:avLst/>
+            </a:prstGeom>
+            <a:noFill/>
+          </p:spPr>
+          <p:txBody>
+            <a:bodyPr wrap="square" rtlCol="0">
+              <a:spAutoFit/>
+            </a:bodyPr>
+            <a:lstStyle/>
+            <a:p>
+              <a:pPr algn="ctr"/>
+              <a:r>
+                <a:rPr lang="en-US" dirty="0"/>
+                <a:t>Surface </a:t>
+              </a:r>
+            </a:p>
+            <a:p>
+              <a:pPr algn="ctr"/>
+              <a:r>
+                <a:rPr lang="en-US" dirty="0"/>
+                <a:t>seed bank</a:t>
+              </a:r>
+            </a:p>
+          </p:txBody>
+        </p:sp>
+      </p:grpSp>
+      <p:sp>
+        <p:nvSpPr>
+          <p:cNvPr id="3" name="TextBox 2">
+            <a:extLst>
+              <a:ext uri="{FF2B5EF4-FFF2-40B4-BE49-F238E27FC236}">
+                <a16:creationId xmlns:a16="http://schemas.microsoft.com/office/drawing/2014/main" id="{0BCE1DC7-36F4-495B-90FF-F42962D5F62B}"/>
+              </a:ext>
+            </a:extLst>
+          </p:cNvPr>
+          <p:cNvSpPr txBox="1"/>
+          <p:nvPr/>
+        </p:nvSpPr>
+        <p:spPr>
+          <a:xfrm>
+            <a:off x="9130526" y="5842337"/>
+            <a:ext cx="2961439" cy="1015663"/>
           </a:xfrm>
           <a:prstGeom prst="rect">
             <a:avLst/>
           </a:prstGeom>
           <a:noFill/>
-          <a:extLst>
-            <a:ext uri="{909E8E84-426E-40DD-AFC4-6F175D3DCCD1}">
-              <a14:hiddenFill xmlns:a14="http://schemas.microsoft.com/office/drawing/2010/main">
-                <a:solidFill>
-                  <a:srgbClr val="FFFFFF"/>
-                </a:solidFill>
-              </a14:hiddenFill>
-            </a:ext>
-          </a:extLst>
         </p:spPr>
         <p:txBody>
-          <a:bodyPr vert="horz" wrap="square" lIns="91440" tIns="45720" rIns="91440" bIns="45720" numCol="1" anchor="t" anchorCtr="0" compatLnSpc="1">
-            <a:prstTxWarp prst="textNoShape">
-              <a:avLst/>
-            </a:prstTxWarp>
+          <a:bodyPr wrap="square" rtlCol="0">
+            <a:spAutoFit/>
           </a:bodyPr>
           <a:lstStyle/>
           <a:p>
-            <a:endParaRPr lang="en-US"/>
-          </a:p>
-        </p:txBody>
-      </p:sp>
+            <a:r>
+              <a:rPr lang="en-US" sz="1200" dirty="0"/>
+              <a:t>* If this plot is ideal, how can I force bar widths to be the same?! If I use position = position_dodge2(preserve = “single”), then chart plots every observation (not plotting mean). </a:t>
+            </a:r>
+          </a:p>
+        </p:txBody>
+      </p:sp>
+    </p:spTree>
+    <p:extLst>
+      <p:ext uri="{BB962C8B-B14F-4D97-AF65-F5344CB8AC3E}">
+        <p14:creationId xmlns:p14="http://schemas.microsoft.com/office/powerpoint/2010/main" val="4095261651"/>
+      </p:ext>
+    </p:extLst>
+  </p:cSld>
+  <p:clrMapOvr>
+    <a:masterClrMapping/>
+  </p:clrMapOvr>
+</p:sld>
+</file>
+
+<file path=ppt/slides/slide8.xml><?xml version="1.0" encoding="utf-8"?>
+<p:sld xmlns:a="http://schemas.openxmlformats.org/drawingml/2006/main" xmlns:r="http://schemas.openxmlformats.org/officeDocument/2006/relationships" xmlns:p="http://schemas.openxmlformats.org/presentationml/2006/main">
+  <p:cSld>
+    <p:spTree>
+      <p:nvGrpSpPr>
+        <p:cNvPr id="1" name=""/>
+        <p:cNvGrpSpPr/>
+        <p:nvPr/>
+      </p:nvGrpSpPr>
+      <p:grpSpPr>
+        <a:xfrm>
+          <a:off x="0" y="0"/>
+          <a:ext cx="0" cy="0"/>
+          <a:chOff x="0" y="0"/>
+          <a:chExt cx="0" cy="0"/>
+        </a:xfrm>
+      </p:grpSpPr>
+      <p:sp>
+        <p:nvSpPr>
+          <p:cNvPr id="2" name="Title 1">
+            <a:extLst>
+              <a:ext uri="{FF2B5EF4-FFF2-40B4-BE49-F238E27FC236}">
+                <a16:creationId xmlns:a16="http://schemas.microsoft.com/office/drawing/2014/main" id="{257A197C-91C0-4A6D-B2B6-40FD7C2A9CCD}"/>
+              </a:ext>
+            </a:extLst>
+          </p:cNvPr>
+          <p:cNvSpPr>
+            <a:spLocks noGrp="1"/>
+          </p:cNvSpPr>
+          <p:nvPr>
+            <p:ph type="title"/>
+          </p:nvPr>
+        </p:nvSpPr>
+        <p:spPr/>
+        <p:txBody>
+          <a:bodyPr>
+            <a:normAutofit/>
+          </a:bodyPr>
+          <a:lstStyle/>
+          <a:p>
+            <a:r>
+              <a:rPr lang="en-US" dirty="0"/>
+              <a:t>If preceding slide is too “busy,” what do you think about faceting by disturbance/estuary? </a:t>
+            </a:r>
+          </a:p>
+        </p:txBody>
+      </p:sp>
+      <p:sp>
+        <p:nvSpPr>
+          <p:cNvPr id="3" name="Content Placeholder 2">
+            <a:extLst>
+              <a:ext uri="{FF2B5EF4-FFF2-40B4-BE49-F238E27FC236}">
+                <a16:creationId xmlns:a16="http://schemas.microsoft.com/office/drawing/2014/main" id="{36A330B7-CA59-4BEB-988B-8CA4B035569E}"/>
+              </a:ext>
+            </a:extLst>
+          </p:cNvPr>
+          <p:cNvSpPr>
+            <a:spLocks noGrp="1"/>
+          </p:cNvSpPr>
+          <p:nvPr>
+            <p:ph idx="1"/>
+          </p:nvPr>
+        </p:nvSpPr>
+        <p:spPr/>
+        <p:txBody>
+          <a:bodyPr/>
+          <a:lstStyle/>
+          <a:p>
+            <a:pPr marL="0" indent="0">
+              <a:buNone/>
+            </a:pPr>
+            <a:r>
+              <a:rPr lang="en-US" dirty="0"/>
+              <a:t>See next 2 slides; personally I like the grouped bar chart to more quickly assess differences in species abundance between </a:t>
+            </a:r>
+            <a:r>
+              <a:rPr lang="en-US"/>
+              <a:t>disturbance categories. </a:t>
+            </a:r>
+            <a:endParaRPr lang="en-US" dirty="0"/>
+          </a:p>
+        </p:txBody>
+      </p:sp>
+    </p:spTree>
+    <p:extLst>
+      <p:ext uri="{BB962C8B-B14F-4D97-AF65-F5344CB8AC3E}">
+        <p14:creationId xmlns:p14="http://schemas.microsoft.com/office/powerpoint/2010/main" val="3190414420"/>
+      </p:ext>
+    </p:extLst>
+  </p:cSld>
+  <p:clrMapOvr>
+    <a:masterClrMapping/>
+  </p:clrMapOvr>
+</p:sld>
+</file>
+
+<file path=ppt/slides/slide9.xml><?xml version="1.0" encoding="utf-8"?>
+<p:sld xmlns:a="http://schemas.openxmlformats.org/drawingml/2006/main" xmlns:r="http://schemas.openxmlformats.org/officeDocument/2006/relationships" xmlns:p="http://schemas.openxmlformats.org/presentationml/2006/main">
+  <p:cSld>
+    <p:spTree>
+      <p:nvGrpSpPr>
+        <p:cNvPr id="1" name=""/>
+        <p:cNvGrpSpPr/>
+        <p:nvPr/>
+      </p:nvGrpSpPr>
+      <p:grpSpPr>
+        <a:xfrm>
+          <a:off x="0" y="0"/>
+          <a:ext cx="0" cy="0"/>
+          <a:chOff x="0" y="0"/>
+          <a:chExt cx="0" cy="0"/>
+        </a:xfrm>
+      </p:grpSpPr>
       <p:pic>
         <p:nvPicPr>
-          <p:cNvPr id="4" name="Picture 3">
-            <a:extLst>
-              <a:ext uri="{FF2B5EF4-FFF2-40B4-BE49-F238E27FC236}">
-                <a16:creationId xmlns:a16="http://schemas.microsoft.com/office/drawing/2014/main" id="{28102C20-1E43-4652-9BD9-4B64D9479935}"/>
+          <p:cNvPr id="2" name="Picture 1">
+            <a:extLst>
+              <a:ext uri="{FF2B5EF4-FFF2-40B4-BE49-F238E27FC236}">
+                <a16:creationId xmlns:a16="http://schemas.microsoft.com/office/drawing/2014/main" id="{3CC23500-4637-4F68-9D77-A9CE3B390AC6}"/>
               </a:ext>
             </a:extLst>
           </p:cNvPr>
@@ -4888,222 +5531,25 @@
           <p:nvPr/>
         </p:nvPicPr>
         <p:blipFill>
-          <a:blip r:embed="rId2">
-            <a:extLst>
-              <a:ext uri="{28A0092B-C50C-407E-A947-70E740481C1C}">
-                <a14:useLocalDpi xmlns:a14="http://schemas.microsoft.com/office/drawing/2010/main" val="0"/>
-              </a:ext>
-            </a:extLst>
-          </a:blip>
+          <a:blip r:embed="rId2"/>
           <a:stretch>
             <a:fillRect/>
           </a:stretch>
         </p:blipFill>
         <p:spPr>
           <a:xfrm>
-            <a:off x="3527253" y="437180"/>
-            <a:ext cx="4832695" cy="3292010"/>
+            <a:off x="621317" y="27137"/>
+            <a:ext cx="10949365" cy="6803726"/>
           </a:xfrm>
           <a:prstGeom prst="rect">
             <a:avLst/>
           </a:prstGeom>
         </p:spPr>
       </p:pic>
-      <p:pic>
-        <p:nvPicPr>
-          <p:cNvPr id="5" name="Picture 4">
-            <a:extLst>
-              <a:ext uri="{FF2B5EF4-FFF2-40B4-BE49-F238E27FC236}">
-                <a16:creationId xmlns:a16="http://schemas.microsoft.com/office/drawing/2014/main" id="{96884535-290E-4E2B-8C4E-30AD247BB70E}"/>
-              </a:ext>
-            </a:extLst>
-          </p:cNvPr>
-          <p:cNvPicPr>
-            <a:picLocks noChangeAspect="1"/>
-          </p:cNvPicPr>
-          <p:nvPr/>
-        </p:nvPicPr>
-        <p:blipFill rotWithShape="1">
-          <a:blip r:embed="rId3"/>
-          <a:srcRect t="6845"/>
-          <a:stretch/>
-        </p:blipFill>
-        <p:spPr>
-          <a:xfrm>
-            <a:off x="3527252" y="3306510"/>
-            <a:ext cx="4832696" cy="3066692"/>
-          </a:xfrm>
-          <a:prstGeom prst="rect">
-            <a:avLst/>
-          </a:prstGeom>
-        </p:spPr>
-      </p:pic>
-      <p:sp>
-        <p:nvSpPr>
-          <p:cNvPr id="8" name="Rectangle 7">
-            <a:extLst>
-              <a:ext uri="{FF2B5EF4-FFF2-40B4-BE49-F238E27FC236}">
-                <a16:creationId xmlns:a16="http://schemas.microsoft.com/office/drawing/2014/main" id="{3679A5F7-0039-4AC4-B822-27C6BDADC7EB}"/>
-              </a:ext>
-            </a:extLst>
-          </p:cNvPr>
-          <p:cNvSpPr/>
-          <p:nvPr/>
-        </p:nvSpPr>
-        <p:spPr>
-          <a:xfrm>
-            <a:off x="7366958" y="1552755"/>
-            <a:ext cx="992990" cy="3795622"/>
-          </a:xfrm>
-          <a:prstGeom prst="rect">
-            <a:avLst/>
-          </a:prstGeom>
-          <a:solidFill>
-            <a:schemeClr val="bg1"/>
-          </a:solidFill>
-          <a:ln>
-            <a:solidFill>
-              <a:schemeClr val="bg1"/>
-            </a:solidFill>
-          </a:ln>
-        </p:spPr>
-        <p:style>
-          <a:lnRef idx="2">
-            <a:schemeClr val="accent1">
-              <a:shade val="50000"/>
-            </a:schemeClr>
-          </a:lnRef>
-          <a:fillRef idx="1">
-            <a:schemeClr val="accent1"/>
-          </a:fillRef>
-          <a:effectRef idx="0">
-            <a:schemeClr val="accent1"/>
-          </a:effectRef>
-          <a:fontRef idx="minor">
-            <a:schemeClr val="lt1"/>
-          </a:fontRef>
-        </p:style>
-        <p:txBody>
-          <a:bodyPr rtlCol="0" anchor="ctr"/>
-          <a:lstStyle/>
-          <a:p>
-            <a:pPr algn="ctr"/>
-            <a:endParaRPr lang="en-US"/>
-          </a:p>
-        </p:txBody>
-      </p:sp>
-      <p:pic>
-        <p:nvPicPr>
-          <p:cNvPr id="7" name="Picture 6">
-            <a:extLst>
-              <a:ext uri="{FF2B5EF4-FFF2-40B4-BE49-F238E27FC236}">
-                <a16:creationId xmlns:a16="http://schemas.microsoft.com/office/drawing/2014/main" id="{2D213856-9B43-4A2C-9402-28D5782E0DA1}"/>
-              </a:ext>
-            </a:extLst>
-          </p:cNvPr>
-          <p:cNvPicPr>
-            <a:picLocks noChangeAspect="1"/>
-          </p:cNvPicPr>
-          <p:nvPr/>
-        </p:nvPicPr>
-        <p:blipFill rotWithShape="1">
-          <a:blip r:embed="rId3"/>
-          <a:srcRect l="77885" t="30961" r="1" b="38642"/>
-          <a:stretch/>
-        </p:blipFill>
-        <p:spPr>
-          <a:xfrm>
-            <a:off x="7687105" y="2905367"/>
-            <a:ext cx="1068705" cy="1000664"/>
-          </a:xfrm>
-          <a:prstGeom prst="rect">
-            <a:avLst/>
-          </a:prstGeom>
-        </p:spPr>
-      </p:pic>
-      <p:sp>
-        <p:nvSpPr>
-          <p:cNvPr id="9" name="TextBox 8">
-            <a:extLst>
-              <a:ext uri="{FF2B5EF4-FFF2-40B4-BE49-F238E27FC236}">
-                <a16:creationId xmlns:a16="http://schemas.microsoft.com/office/drawing/2014/main" id="{5CFCB7DB-33E8-4488-885C-888EAFB39141}"/>
-              </a:ext>
-            </a:extLst>
-          </p:cNvPr>
-          <p:cNvSpPr txBox="1"/>
-          <p:nvPr/>
-        </p:nvSpPr>
-        <p:spPr>
-          <a:xfrm>
-            <a:off x="2047495" y="1552755"/>
-            <a:ext cx="1481265" cy="923330"/>
-          </a:xfrm>
-          <a:prstGeom prst="rect">
-            <a:avLst/>
-          </a:prstGeom>
-          <a:noFill/>
-        </p:spPr>
-        <p:txBody>
-          <a:bodyPr wrap="square" rtlCol="0">
-            <a:spAutoFit/>
-          </a:bodyPr>
-          <a:lstStyle/>
-          <a:p>
-            <a:pPr algn="ctr"/>
-            <a:r>
-              <a:rPr lang="en-US" dirty="0"/>
-              <a:t>Above ground vegetation</a:t>
-            </a:r>
-          </a:p>
-        </p:txBody>
-      </p:sp>
-      <p:sp>
-        <p:nvSpPr>
-          <p:cNvPr id="10" name="TextBox 9">
-            <a:extLst>
-              <a:ext uri="{FF2B5EF4-FFF2-40B4-BE49-F238E27FC236}">
-                <a16:creationId xmlns:a16="http://schemas.microsoft.com/office/drawing/2014/main" id="{AF9CA1F9-0F2A-4026-8AFB-722BCCF36044}"/>
-              </a:ext>
-            </a:extLst>
-          </p:cNvPr>
-          <p:cNvSpPr txBox="1"/>
-          <p:nvPr/>
-        </p:nvSpPr>
-        <p:spPr>
-          <a:xfrm>
-            <a:off x="2047495" y="4205250"/>
-            <a:ext cx="1481265" cy="646331"/>
-          </a:xfrm>
-          <a:prstGeom prst="rect">
-            <a:avLst/>
-          </a:prstGeom>
-          <a:noFill/>
-        </p:spPr>
-        <p:txBody>
-          <a:bodyPr wrap="square" rtlCol="0">
-            <a:spAutoFit/>
-          </a:bodyPr>
-          <a:lstStyle/>
-          <a:p>
-            <a:pPr algn="ctr"/>
-            <a:r>
-              <a:rPr lang="en-US" dirty="0"/>
-              <a:t>Surface </a:t>
-            </a:r>
-          </a:p>
-          <a:p>
-            <a:pPr algn="ctr"/>
-            <a:r>
-              <a:rPr lang="en-US" dirty="0"/>
-              <a:t>seed bank</a:t>
-            </a:r>
-          </a:p>
-        </p:txBody>
-      </p:sp>
     </p:spTree>
     <p:extLst>
       <p:ext uri="{BB962C8B-B14F-4D97-AF65-F5344CB8AC3E}">
-        <p14:creationId xmlns:p14="http://schemas.microsoft.com/office/powerpoint/2010/main" val="4095261651"/>
+        <p14:creationId xmlns:p14="http://schemas.microsoft.com/office/powerpoint/2010/main" val="3812361324"/>
       </p:ext>
     </p:extLst>
   </p:cSld>
@@ -5409,6 +5855,12 @@
 </file>
 
 <file path=customXml/item1.xml><?xml version="1.0" encoding="utf-8"?>
+<p:properties xmlns:p="http://schemas.microsoft.com/office/2006/metadata/properties" xmlns:xsi="http://www.w3.org/2001/XMLSchema-instance" xmlns:pc="http://schemas.microsoft.com/office/infopath/2007/PartnerControls">
+  <documentManagement/>
+</p:properties>
+</file>
+
+<file path=customXml/item2.xml><?xml version="1.0" encoding="utf-8"?>
 <ct:contentTypeSchema xmlns:ct="http://schemas.microsoft.com/office/2006/metadata/contentType" xmlns:ma="http://schemas.microsoft.com/office/2006/metadata/properties/metaAttributes" ct:_="" ma:_="" ma:contentTypeName="Document" ma:contentTypeID="0x010100483727557648AA40B029C215891F95C5" ma:contentTypeVersion="14" ma:contentTypeDescription="Create a new document." ma:contentTypeScope="" ma:versionID="d36f379eec1cf084072dcf956aecbcf8">
   <xsd:schema xmlns:xsd="http://www.w3.org/2001/XMLSchema" xmlns:xs="http://www.w3.org/2001/XMLSchema" xmlns:p="http://schemas.microsoft.com/office/2006/metadata/properties" xmlns:ns3="8c008993-a31f-4b40-b1f3-88dd9c6e1924" xmlns:ns4="360018dd-41eb-4458-b1d4-4b46a95a2b02" targetNamespace="http://schemas.microsoft.com/office/2006/metadata/properties" ma:root="true" ma:fieldsID="bd1f472f1ef3281fe4dbeb8213942d38" ns3:_="" ns4:_="">
     <xsd:import namespace="8c008993-a31f-4b40-b1f3-88dd9c6e1924"/>
@@ -5637,7 +6089,7 @@
 </ct:contentTypeSchema>
 </file>
 
-<file path=customXml/item2.xml><?xml version="1.0" encoding="utf-8"?>
+<file path=customXml/item3.xml><?xml version="1.0" encoding="utf-8"?>
 <?mso-contentType ?>
 <FormTemplates xmlns="http://schemas.microsoft.com/sharepoint/v3/contenttype/forms">
   <Display>DocumentLibraryForm</Display>
@@ -5646,13 +6098,24 @@
 </FormTemplates>
 </file>
 
-<file path=customXml/item3.xml><?xml version="1.0" encoding="utf-8"?>
-<p:properties xmlns:p="http://schemas.microsoft.com/office/2006/metadata/properties" xmlns:xsi="http://www.w3.org/2001/XMLSchema-instance" xmlns:pc="http://schemas.microsoft.com/office/infopath/2007/PartnerControls">
-  <documentManagement/>
-</p:properties>
+<file path=customXml/itemProps1.xml><?xml version="1.0" encoding="utf-8"?>
+<ds:datastoreItem xmlns:ds="http://schemas.openxmlformats.org/officeDocument/2006/customXml" ds:itemID="{10F6163B-152D-4FBB-A53A-C9E6E87DB3DC}">
+  <ds:schemaRefs>
+    <ds:schemaRef ds:uri="http://purl.org/dc/elements/1.1/"/>
+    <ds:schemaRef ds:uri="http://purl.org/dc/dcmitype/"/>
+    <ds:schemaRef ds:uri="http://www.w3.org/XML/1998/namespace"/>
+    <ds:schemaRef ds:uri="http://schemas.microsoft.com/office/2006/documentManagement/types"/>
+    <ds:schemaRef ds:uri="http://purl.org/dc/terms/"/>
+    <ds:schemaRef ds:uri="http://schemas.microsoft.com/office/2006/metadata/properties"/>
+    <ds:schemaRef ds:uri="http://schemas.microsoft.com/office/infopath/2007/PartnerControls"/>
+    <ds:schemaRef ds:uri="http://schemas.openxmlformats.org/package/2006/metadata/core-properties"/>
+    <ds:schemaRef ds:uri="360018dd-41eb-4458-b1d4-4b46a95a2b02"/>
+    <ds:schemaRef ds:uri="8c008993-a31f-4b40-b1f3-88dd9c6e1924"/>
+  </ds:schemaRefs>
+</ds:datastoreItem>
 </file>
 
-<file path=customXml/itemProps1.xml><?xml version="1.0" encoding="utf-8"?>
+<file path=customXml/itemProps2.xml><?xml version="1.0" encoding="utf-8"?>
 <ds:datastoreItem xmlns:ds="http://schemas.openxmlformats.org/officeDocument/2006/customXml" ds:itemID="{05D33C84-E14B-40CB-BA88-93037D12400D}">
   <ds:schemaRefs>
     <ds:schemaRef ds:uri="http://schemas.microsoft.com/office/2006/metadata/contentType"/>
@@ -5671,27 +6134,10 @@
 </ds:datastoreItem>
 </file>
 
-<file path=customXml/itemProps2.xml><?xml version="1.0" encoding="utf-8"?>
+<file path=customXml/itemProps3.xml><?xml version="1.0" encoding="utf-8"?>
 <ds:datastoreItem xmlns:ds="http://schemas.openxmlformats.org/officeDocument/2006/customXml" ds:itemID="{936EF84A-8CAE-4391-8991-945D21A56A65}">
   <ds:schemaRefs>
     <ds:schemaRef ds:uri="http://schemas.microsoft.com/sharepoint/v3/contenttype/forms"/>
   </ds:schemaRefs>
 </ds:datastoreItem>
-</file>
-
-<file path=customXml/itemProps3.xml><?xml version="1.0" encoding="utf-8"?>
-<ds:datastoreItem xmlns:ds="http://schemas.openxmlformats.org/officeDocument/2006/customXml" ds:itemID="{10F6163B-152D-4FBB-A53A-C9E6E87DB3DC}">
-  <ds:schemaRefs>
-    <ds:schemaRef ds:uri="http://purl.org/dc/terms/"/>
-    <ds:schemaRef ds:uri="http://purl.org/dc/elements/1.1/"/>
-    <ds:schemaRef ds:uri="http://schemas.microsoft.com/office/2006/documentManagement/types"/>
-    <ds:schemaRef ds:uri="http://www.w3.org/XML/1998/namespace"/>
-    <ds:schemaRef ds:uri="360018dd-41eb-4458-b1d4-4b46a95a2b02"/>
-    <ds:schemaRef ds:uri="http://purl.org/dc/dcmitype/"/>
-    <ds:schemaRef ds:uri="8c008993-a31f-4b40-b1f3-88dd9c6e1924"/>
-    <ds:schemaRef ds:uri="http://schemas.microsoft.com/office/infopath/2007/PartnerControls"/>
-    <ds:schemaRef ds:uri="http://schemas.openxmlformats.org/package/2006/metadata/core-properties"/>
-    <ds:schemaRef ds:uri="http://schemas.microsoft.com/office/2006/metadata/properties"/>
-  </ds:schemaRefs>
-</ds:datastoreItem>
 </file>
</xml_diff>

<commit_message>
manuscript draft text and metadata created
</commit_message>
<xml_diff>
--- a/code_output.pptx
+++ b/code_output.pptx
@@ -123,6 +123,195 @@
 
 <file path=ppt/changesInfos/changesInfo1.xml><?xml version="1.0" encoding="utf-8"?>
 <pc:chgInfo xmlns:a="http://schemas.openxmlformats.org/drawingml/2006/main" xmlns:r="http://schemas.openxmlformats.org/officeDocument/2006/relationships" xmlns:ac="http://schemas.microsoft.com/office/drawing/2013/main/command" xmlns:pc="http://schemas.microsoft.com/office/powerpoint/2013/main/command">
+  <pc:docChgLst>
+    <pc:chgData name="Lane, Stefanie" userId="4a8c6c9c-e558-4387-bb26-bde8015993b6" providerId="ADAL" clId="{7CD9BF8C-EB0F-4688-975B-5AD35C5A5350}"/>
+    <pc:docChg chg="modSld">
+      <pc:chgData name="Lane, Stefanie" userId="4a8c6c9c-e558-4387-bb26-bde8015993b6" providerId="ADAL" clId="{7CD9BF8C-EB0F-4688-975B-5AD35C5A5350}" dt="2022-11-11T22:06:45.486" v="16" actId="1076"/>
+      <pc:docMkLst>
+        <pc:docMk/>
+      </pc:docMkLst>
+      <pc:sldChg chg="addSp modSp">
+        <pc:chgData name="Lane, Stefanie" userId="4a8c6c9c-e558-4387-bb26-bde8015993b6" providerId="ADAL" clId="{7CD9BF8C-EB0F-4688-975B-5AD35C5A5350}" dt="2022-11-11T21:23:35.119" v="2" actId="164"/>
+        <pc:sldMkLst>
+          <pc:docMk/>
+          <pc:sldMk cId="1357108148" sldId="260"/>
+        </pc:sldMkLst>
+        <pc:spChg chg="mod">
+          <ac:chgData name="Lane, Stefanie" userId="4a8c6c9c-e558-4387-bb26-bde8015993b6" providerId="ADAL" clId="{7CD9BF8C-EB0F-4688-975B-5AD35C5A5350}" dt="2022-11-11T21:23:35.119" v="2" actId="164"/>
+          <ac:spMkLst>
+            <pc:docMk/>
+            <pc:sldMk cId="1357108148" sldId="260"/>
+            <ac:spMk id="6" creationId="{F7A090DE-BD2B-47FF-A170-5C99390278B2}"/>
+          </ac:spMkLst>
+        </pc:spChg>
+        <pc:grpChg chg="add mod">
+          <ac:chgData name="Lane, Stefanie" userId="4a8c6c9c-e558-4387-bb26-bde8015993b6" providerId="ADAL" clId="{7CD9BF8C-EB0F-4688-975B-5AD35C5A5350}" dt="2022-11-11T21:23:35.119" v="2" actId="164"/>
+          <ac:grpSpMkLst>
+            <pc:docMk/>
+            <pc:sldMk cId="1357108148" sldId="260"/>
+            <ac:grpSpMk id="7" creationId="{2C49A251-D6F2-4928-A716-08C3336B6592}"/>
+          </ac:grpSpMkLst>
+        </pc:grpChg>
+        <pc:picChg chg="mod">
+          <ac:chgData name="Lane, Stefanie" userId="4a8c6c9c-e558-4387-bb26-bde8015993b6" providerId="ADAL" clId="{7CD9BF8C-EB0F-4688-975B-5AD35C5A5350}" dt="2022-11-11T21:23:35.119" v="2" actId="164"/>
+          <ac:picMkLst>
+            <pc:docMk/>
+            <pc:sldMk cId="1357108148" sldId="260"/>
+            <ac:picMk id="2" creationId="{D45A83D0-F052-4E25-88AA-E6A1221A9FFE}"/>
+          </ac:picMkLst>
+        </pc:picChg>
+        <pc:picChg chg="mod">
+          <ac:chgData name="Lane, Stefanie" userId="4a8c6c9c-e558-4387-bb26-bde8015993b6" providerId="ADAL" clId="{7CD9BF8C-EB0F-4688-975B-5AD35C5A5350}" dt="2022-11-11T21:23:35.119" v="2" actId="164"/>
+          <ac:picMkLst>
+            <pc:docMk/>
+            <pc:sldMk cId="1357108148" sldId="260"/>
+            <ac:picMk id="3" creationId="{BAEF06C2-271F-475A-8C0B-ACFC4B4012BA}"/>
+          </ac:picMkLst>
+        </pc:picChg>
+        <pc:picChg chg="mod">
+          <ac:chgData name="Lane, Stefanie" userId="4a8c6c9c-e558-4387-bb26-bde8015993b6" providerId="ADAL" clId="{7CD9BF8C-EB0F-4688-975B-5AD35C5A5350}" dt="2022-11-11T21:23:35.119" v="2" actId="164"/>
+          <ac:picMkLst>
+            <pc:docMk/>
+            <pc:sldMk cId="1357108148" sldId="260"/>
+            <ac:picMk id="4" creationId="{FFC51D9F-26F7-442B-853C-F22B7381B8D0}"/>
+          </ac:picMkLst>
+        </pc:picChg>
+        <pc:picChg chg="mod">
+          <ac:chgData name="Lane, Stefanie" userId="4a8c6c9c-e558-4387-bb26-bde8015993b6" providerId="ADAL" clId="{7CD9BF8C-EB0F-4688-975B-5AD35C5A5350}" dt="2022-11-11T21:23:35.119" v="2" actId="164"/>
+          <ac:picMkLst>
+            <pc:docMk/>
+            <pc:sldMk cId="1357108148" sldId="260"/>
+            <ac:picMk id="5" creationId="{26470400-C662-460D-B54F-AC0F631CA8B0}"/>
+          </ac:picMkLst>
+        </pc:picChg>
+      </pc:sldChg>
+      <pc:sldChg chg="addSp modSp">
+        <pc:chgData name="Lane, Stefanie" userId="4a8c6c9c-e558-4387-bb26-bde8015993b6" providerId="ADAL" clId="{7CD9BF8C-EB0F-4688-975B-5AD35C5A5350}" dt="2022-11-11T21:39:21.415" v="11" actId="164"/>
+        <pc:sldMkLst>
+          <pc:docMk/>
+          <pc:sldMk cId="3551481397" sldId="261"/>
+        </pc:sldMkLst>
+        <pc:spChg chg="mod">
+          <ac:chgData name="Lane, Stefanie" userId="4a8c6c9c-e558-4387-bb26-bde8015993b6" providerId="ADAL" clId="{7CD9BF8C-EB0F-4688-975B-5AD35C5A5350}" dt="2022-11-11T21:39:21.415" v="11" actId="164"/>
+          <ac:spMkLst>
+            <pc:docMk/>
+            <pc:sldMk cId="3551481397" sldId="261"/>
+            <ac:spMk id="6" creationId="{E226B57D-4BF1-4F22-98BD-FD0307336F3A}"/>
+          </ac:spMkLst>
+        </pc:spChg>
+        <pc:grpChg chg="add mod">
+          <ac:chgData name="Lane, Stefanie" userId="4a8c6c9c-e558-4387-bb26-bde8015993b6" providerId="ADAL" clId="{7CD9BF8C-EB0F-4688-975B-5AD35C5A5350}" dt="2022-11-11T21:39:21.415" v="11" actId="164"/>
+          <ac:grpSpMkLst>
+            <pc:docMk/>
+            <pc:sldMk cId="3551481397" sldId="261"/>
+            <ac:grpSpMk id="7" creationId="{1F614A4F-F183-4453-956D-5C454F6B0D4D}"/>
+          </ac:grpSpMkLst>
+        </pc:grpChg>
+        <pc:picChg chg="mod">
+          <ac:chgData name="Lane, Stefanie" userId="4a8c6c9c-e558-4387-bb26-bde8015993b6" providerId="ADAL" clId="{7CD9BF8C-EB0F-4688-975B-5AD35C5A5350}" dt="2022-11-11T21:39:21.415" v="11" actId="164"/>
+          <ac:picMkLst>
+            <pc:docMk/>
+            <pc:sldMk cId="3551481397" sldId="261"/>
+            <ac:picMk id="2" creationId="{534C45FE-8466-4C28-B189-A80430D29A45}"/>
+          </ac:picMkLst>
+        </pc:picChg>
+        <pc:picChg chg="mod">
+          <ac:chgData name="Lane, Stefanie" userId="4a8c6c9c-e558-4387-bb26-bde8015993b6" providerId="ADAL" clId="{7CD9BF8C-EB0F-4688-975B-5AD35C5A5350}" dt="2022-11-11T21:39:21.415" v="11" actId="164"/>
+          <ac:picMkLst>
+            <pc:docMk/>
+            <pc:sldMk cId="3551481397" sldId="261"/>
+            <ac:picMk id="3" creationId="{4B27D299-3F0C-4BDA-88AF-E4E16113DF29}"/>
+          </ac:picMkLst>
+        </pc:picChg>
+        <pc:picChg chg="mod">
+          <ac:chgData name="Lane, Stefanie" userId="4a8c6c9c-e558-4387-bb26-bde8015993b6" providerId="ADAL" clId="{7CD9BF8C-EB0F-4688-975B-5AD35C5A5350}" dt="2022-11-11T21:39:21.415" v="11" actId="164"/>
+          <ac:picMkLst>
+            <pc:docMk/>
+            <pc:sldMk cId="3551481397" sldId="261"/>
+            <ac:picMk id="4" creationId="{83AF3617-00C3-4BA7-B36B-8804D10CDCC2}"/>
+          </ac:picMkLst>
+        </pc:picChg>
+        <pc:picChg chg="mod">
+          <ac:chgData name="Lane, Stefanie" userId="4a8c6c9c-e558-4387-bb26-bde8015993b6" providerId="ADAL" clId="{7CD9BF8C-EB0F-4688-975B-5AD35C5A5350}" dt="2022-11-11T21:39:21.415" v="11" actId="164"/>
+          <ac:picMkLst>
+            <pc:docMk/>
+            <pc:sldMk cId="3551481397" sldId="261"/>
+            <ac:picMk id="5" creationId="{BF619DD8-D4DB-4932-94DC-152FE0155334}"/>
+          </ac:picMkLst>
+        </pc:picChg>
+      </pc:sldChg>
+      <pc:sldChg chg="addSp modSp">
+        <pc:chgData name="Lane, Stefanie" userId="4a8c6c9c-e558-4387-bb26-bde8015993b6" providerId="ADAL" clId="{7CD9BF8C-EB0F-4688-975B-5AD35C5A5350}" dt="2022-11-11T21:35:21.238" v="4" actId="164"/>
+        <pc:sldMkLst>
+          <pc:docMk/>
+          <pc:sldMk cId="1659934246" sldId="262"/>
+        </pc:sldMkLst>
+        <pc:spChg chg="mod">
+          <ac:chgData name="Lane, Stefanie" userId="4a8c6c9c-e558-4387-bb26-bde8015993b6" providerId="ADAL" clId="{7CD9BF8C-EB0F-4688-975B-5AD35C5A5350}" dt="2022-11-11T21:35:21.238" v="4" actId="164"/>
+          <ac:spMkLst>
+            <pc:docMk/>
+            <pc:sldMk cId="1659934246" sldId="262"/>
+            <ac:spMk id="6" creationId="{9439C708-CAB7-4DE2-AE75-07E8F62C7B33}"/>
+          </ac:spMkLst>
+        </pc:spChg>
+        <pc:grpChg chg="add mod">
+          <ac:chgData name="Lane, Stefanie" userId="4a8c6c9c-e558-4387-bb26-bde8015993b6" providerId="ADAL" clId="{7CD9BF8C-EB0F-4688-975B-5AD35C5A5350}" dt="2022-11-11T21:35:21.238" v="4" actId="164"/>
+          <ac:grpSpMkLst>
+            <pc:docMk/>
+            <pc:sldMk cId="1659934246" sldId="262"/>
+            <ac:grpSpMk id="7" creationId="{A882132A-AFB4-4E3B-967F-DBAA1C395664}"/>
+          </ac:grpSpMkLst>
+        </pc:grpChg>
+        <pc:picChg chg="mod">
+          <ac:chgData name="Lane, Stefanie" userId="4a8c6c9c-e558-4387-bb26-bde8015993b6" providerId="ADAL" clId="{7CD9BF8C-EB0F-4688-975B-5AD35C5A5350}" dt="2022-11-11T21:35:21.238" v="4" actId="164"/>
+          <ac:picMkLst>
+            <pc:docMk/>
+            <pc:sldMk cId="1659934246" sldId="262"/>
+            <ac:picMk id="2" creationId="{00B30A66-ADED-4E5B-9B83-2932D91418BC}"/>
+          </ac:picMkLst>
+        </pc:picChg>
+        <pc:picChg chg="mod">
+          <ac:chgData name="Lane, Stefanie" userId="4a8c6c9c-e558-4387-bb26-bde8015993b6" providerId="ADAL" clId="{7CD9BF8C-EB0F-4688-975B-5AD35C5A5350}" dt="2022-11-11T21:35:21.238" v="4" actId="164"/>
+          <ac:picMkLst>
+            <pc:docMk/>
+            <pc:sldMk cId="1659934246" sldId="262"/>
+            <ac:picMk id="3" creationId="{3D6E26F4-7D92-45F9-A180-9F430BD1E645}"/>
+          </ac:picMkLst>
+        </pc:picChg>
+        <pc:picChg chg="mod">
+          <ac:chgData name="Lane, Stefanie" userId="4a8c6c9c-e558-4387-bb26-bde8015993b6" providerId="ADAL" clId="{7CD9BF8C-EB0F-4688-975B-5AD35C5A5350}" dt="2022-11-11T21:35:21.238" v="4" actId="164"/>
+          <ac:picMkLst>
+            <pc:docMk/>
+            <pc:sldMk cId="1659934246" sldId="262"/>
+            <ac:picMk id="4" creationId="{E2FCFD61-B800-437F-A098-3030E721C94E}"/>
+          </ac:picMkLst>
+        </pc:picChg>
+        <pc:picChg chg="mod">
+          <ac:chgData name="Lane, Stefanie" userId="4a8c6c9c-e558-4387-bb26-bde8015993b6" providerId="ADAL" clId="{7CD9BF8C-EB0F-4688-975B-5AD35C5A5350}" dt="2022-11-11T21:35:21.238" v="4" actId="164"/>
+          <ac:picMkLst>
+            <pc:docMk/>
+            <pc:sldMk cId="1659934246" sldId="262"/>
+            <ac:picMk id="5" creationId="{1AFC3578-3E3D-48A6-8748-D7FFA74E1862}"/>
+          </ac:picMkLst>
+        </pc:picChg>
+      </pc:sldChg>
+      <pc:sldChg chg="modSp">
+        <pc:chgData name="Lane, Stefanie" userId="4a8c6c9c-e558-4387-bb26-bde8015993b6" providerId="ADAL" clId="{7CD9BF8C-EB0F-4688-975B-5AD35C5A5350}" dt="2022-11-11T22:06:45.486" v="16" actId="1076"/>
+        <pc:sldMkLst>
+          <pc:docMk/>
+          <pc:sldMk cId="1318038477" sldId="263"/>
+        </pc:sldMkLst>
+        <pc:spChg chg="mod">
+          <ac:chgData name="Lane, Stefanie" userId="4a8c6c9c-e558-4387-bb26-bde8015993b6" providerId="ADAL" clId="{7CD9BF8C-EB0F-4688-975B-5AD35C5A5350}" dt="2022-11-11T22:06:45.486" v="16" actId="1076"/>
+          <ac:spMkLst>
+            <pc:docMk/>
+            <pc:sldMk cId="1318038477" sldId="263"/>
+            <ac:spMk id="6" creationId="{769B52BC-74AF-41D1-8A2D-D95FD579FF6C}"/>
+          </ac:spMkLst>
+        </pc:spChg>
+      </pc:sldChg>
+    </pc:docChg>
+  </pc:docChgLst>
   <pc:docChgLst>
     <pc:chgData name="Lane, Stefanie" userId="4a8c6c9c-e558-4387-bb26-bde8015993b6" providerId="ADAL" clId="{57E403F5-BD30-4B6D-B9C7-4ADF5389E353}"/>
     <pc:docChg chg="undo custSel addSld modSld">
@@ -616,7 +805,7 @@
           <a:p>
             <a:fld id="{22CD44A9-BD90-44AE-81F7-965A00CBDE3A}" type="datetimeFigureOut">
               <a:rPr lang="en-US" smtClean="0"/>
-              <a:t>10/28/2022</a:t>
+              <a:t>11/11/2022</a:t>
             </a:fld>
             <a:endParaRPr lang="en-US"/>
           </a:p>
@@ -814,7 +1003,7 @@
           <a:p>
             <a:fld id="{22CD44A9-BD90-44AE-81F7-965A00CBDE3A}" type="datetimeFigureOut">
               <a:rPr lang="en-US" smtClean="0"/>
-              <a:t>10/28/2022</a:t>
+              <a:t>11/11/2022</a:t>
             </a:fld>
             <a:endParaRPr lang="en-US"/>
           </a:p>
@@ -1022,7 +1211,7 @@
           <a:p>
             <a:fld id="{22CD44A9-BD90-44AE-81F7-965A00CBDE3A}" type="datetimeFigureOut">
               <a:rPr lang="en-US" smtClean="0"/>
-              <a:t>10/28/2022</a:t>
+              <a:t>11/11/2022</a:t>
             </a:fld>
             <a:endParaRPr lang="en-US"/>
           </a:p>
@@ -1220,7 +1409,7 @@
           <a:p>
             <a:fld id="{22CD44A9-BD90-44AE-81F7-965A00CBDE3A}" type="datetimeFigureOut">
               <a:rPr lang="en-US" smtClean="0"/>
-              <a:t>10/28/2022</a:t>
+              <a:t>11/11/2022</a:t>
             </a:fld>
             <a:endParaRPr lang="en-US"/>
           </a:p>
@@ -1495,7 +1684,7 @@
           <a:p>
             <a:fld id="{22CD44A9-BD90-44AE-81F7-965A00CBDE3A}" type="datetimeFigureOut">
               <a:rPr lang="en-US" smtClean="0"/>
-              <a:t>10/28/2022</a:t>
+              <a:t>11/11/2022</a:t>
             </a:fld>
             <a:endParaRPr lang="en-US"/>
           </a:p>
@@ -1760,7 +1949,7 @@
           <a:p>
             <a:fld id="{22CD44A9-BD90-44AE-81F7-965A00CBDE3A}" type="datetimeFigureOut">
               <a:rPr lang="en-US" smtClean="0"/>
-              <a:t>10/28/2022</a:t>
+              <a:t>11/11/2022</a:t>
             </a:fld>
             <a:endParaRPr lang="en-US"/>
           </a:p>
@@ -2172,7 +2361,7 @@
           <a:p>
             <a:fld id="{22CD44A9-BD90-44AE-81F7-965A00CBDE3A}" type="datetimeFigureOut">
               <a:rPr lang="en-US" smtClean="0"/>
-              <a:t>10/28/2022</a:t>
+              <a:t>11/11/2022</a:t>
             </a:fld>
             <a:endParaRPr lang="en-US"/>
           </a:p>
@@ -2313,7 +2502,7 @@
           <a:p>
             <a:fld id="{22CD44A9-BD90-44AE-81F7-965A00CBDE3A}" type="datetimeFigureOut">
               <a:rPr lang="en-US" smtClean="0"/>
-              <a:t>10/28/2022</a:t>
+              <a:t>11/11/2022</a:t>
             </a:fld>
             <a:endParaRPr lang="en-US"/>
           </a:p>
@@ -2426,7 +2615,7 @@
           <a:p>
             <a:fld id="{22CD44A9-BD90-44AE-81F7-965A00CBDE3A}" type="datetimeFigureOut">
               <a:rPr lang="en-US" smtClean="0"/>
-              <a:t>10/28/2022</a:t>
+              <a:t>11/11/2022</a:t>
             </a:fld>
             <a:endParaRPr lang="en-US"/>
           </a:p>
@@ -2737,7 +2926,7 @@
           <a:p>
             <a:fld id="{22CD44A9-BD90-44AE-81F7-965A00CBDE3A}" type="datetimeFigureOut">
               <a:rPr lang="en-US" smtClean="0"/>
-              <a:t>10/28/2022</a:t>
+              <a:t>11/11/2022</a:t>
             </a:fld>
             <a:endParaRPr lang="en-US"/>
           </a:p>
@@ -3025,7 +3214,7 @@
           <a:p>
             <a:fld id="{22CD44A9-BD90-44AE-81F7-965A00CBDE3A}" type="datetimeFigureOut">
               <a:rPr lang="en-US" smtClean="0"/>
-              <a:t>10/28/2022</a:t>
+              <a:t>11/11/2022</a:t>
             </a:fld>
             <a:endParaRPr lang="en-US"/>
           </a:p>
@@ -3266,7 +3455,7 @@
           <a:p>
             <a:fld id="{22CD44A9-BD90-44AE-81F7-965A00CBDE3A}" type="datetimeFigureOut">
               <a:rPr lang="en-US" smtClean="0"/>
-              <a:t>10/28/2022</a:t>
+              <a:t>11/11/2022</a:t>
             </a:fld>
             <a:endParaRPr lang="en-US"/>
           </a:p>
@@ -3683,167 +3872,188 @@
           <a:chExt cx="0" cy="0"/>
         </a:xfrm>
       </p:grpSpPr>
-      <p:pic>
-        <p:nvPicPr>
-          <p:cNvPr id="2" name="Picture 1">
-            <a:extLst>
-              <a:ext uri="{FF2B5EF4-FFF2-40B4-BE49-F238E27FC236}">
-                <a16:creationId xmlns:a16="http://schemas.microsoft.com/office/drawing/2014/main" id="{D45A83D0-F052-4E25-88AA-E6A1221A9FFE}"/>
-              </a:ext>
-            </a:extLst>
-          </p:cNvPr>
-          <p:cNvPicPr>
-            <a:picLocks noChangeAspect="1"/>
-          </p:cNvPicPr>
+      <p:grpSp>
+        <p:nvGrpSpPr>
+          <p:cNvPr id="7" name="Group 6">
+            <a:extLst>
+              <a:ext uri="{FF2B5EF4-FFF2-40B4-BE49-F238E27FC236}">
+                <a16:creationId xmlns:a16="http://schemas.microsoft.com/office/drawing/2014/main" id="{2C49A251-D6F2-4928-A716-08C3336B6592}"/>
+              </a:ext>
+            </a:extLst>
+          </p:cNvPr>
+          <p:cNvGrpSpPr/>
           <p:nvPr/>
-        </p:nvPicPr>
-        <p:blipFill>
-          <a:blip r:embed="rId2"/>
-          <a:stretch>
-            <a:fillRect/>
-          </a:stretch>
-        </p:blipFill>
-        <p:spPr>
+        </p:nvGrpSpPr>
+        <p:grpSpPr>
           <a:xfrm>
             <a:off x="-71512" y="-9939"/>
-            <a:ext cx="4954085" cy="3438939"/>
+            <a:ext cx="12263512" cy="5526156"/>
+            <a:chOff x="-71512" y="-9939"/>
+            <a:chExt cx="12263512" cy="5526156"/>
           </a:xfrm>
-          <a:prstGeom prst="rect">
-            <a:avLst/>
-          </a:prstGeom>
-        </p:spPr>
-      </p:pic>
-      <p:pic>
-        <p:nvPicPr>
-          <p:cNvPr id="3" name="Picture 2">
-            <a:extLst>
-              <a:ext uri="{FF2B5EF4-FFF2-40B4-BE49-F238E27FC236}">
-                <a16:creationId xmlns:a16="http://schemas.microsoft.com/office/drawing/2014/main" id="{BAEF06C2-271F-475A-8C0B-ACFC4B4012BA}"/>
-              </a:ext>
-            </a:extLst>
-          </p:cNvPr>
-          <p:cNvPicPr>
-            <a:picLocks noChangeAspect="1"/>
-          </p:cNvPicPr>
-          <p:nvPr/>
-        </p:nvPicPr>
-        <p:blipFill>
-          <a:blip r:embed="rId3"/>
-          <a:stretch>
-            <a:fillRect/>
-          </a:stretch>
-        </p:blipFill>
-        <p:spPr>
-          <a:xfrm>
-            <a:off x="98977" y="3429000"/>
-            <a:ext cx="4857750" cy="600075"/>
-          </a:xfrm>
-          <a:prstGeom prst="rect">
-            <a:avLst/>
-          </a:prstGeom>
-        </p:spPr>
-      </p:pic>
-      <p:pic>
-        <p:nvPicPr>
-          <p:cNvPr id="4" name="Picture 3">
-            <a:extLst>
-              <a:ext uri="{FF2B5EF4-FFF2-40B4-BE49-F238E27FC236}">
-                <a16:creationId xmlns:a16="http://schemas.microsoft.com/office/drawing/2014/main" id="{FFC51D9F-26F7-442B-853C-F22B7381B8D0}"/>
-              </a:ext>
-            </a:extLst>
-          </p:cNvPr>
-          <p:cNvPicPr>
-            <a:picLocks noChangeAspect="1"/>
-          </p:cNvPicPr>
-          <p:nvPr/>
-        </p:nvPicPr>
-        <p:blipFill>
-          <a:blip r:embed="rId4"/>
-          <a:stretch>
-            <a:fillRect/>
-          </a:stretch>
-        </p:blipFill>
-        <p:spPr>
-          <a:xfrm>
-            <a:off x="5791200" y="0"/>
-            <a:ext cx="6400800" cy="4210050"/>
-          </a:xfrm>
-          <a:prstGeom prst="rect">
-            <a:avLst/>
-          </a:prstGeom>
-        </p:spPr>
-      </p:pic>
-      <p:pic>
-        <p:nvPicPr>
-          <p:cNvPr id="5" name="Picture 4">
-            <a:extLst>
-              <a:ext uri="{FF2B5EF4-FFF2-40B4-BE49-F238E27FC236}">
-                <a16:creationId xmlns:a16="http://schemas.microsoft.com/office/drawing/2014/main" id="{26470400-C662-460D-B54F-AC0F631CA8B0}"/>
-              </a:ext>
-            </a:extLst>
-          </p:cNvPr>
-          <p:cNvPicPr>
-            <a:picLocks noChangeAspect="1"/>
-          </p:cNvPicPr>
-          <p:nvPr/>
-        </p:nvPicPr>
-        <p:blipFill>
-          <a:blip r:embed="rId5"/>
-          <a:stretch>
-            <a:fillRect/>
-          </a:stretch>
-        </p:blipFill>
-        <p:spPr>
-          <a:xfrm>
-            <a:off x="6683651" y="4316067"/>
-            <a:ext cx="5438775" cy="1200150"/>
-          </a:xfrm>
-          <a:prstGeom prst="rect">
-            <a:avLst/>
-          </a:prstGeom>
-        </p:spPr>
-      </p:pic>
-      <p:sp>
-        <p:nvSpPr>
-          <p:cNvPr id="6" name="TextBox 5">
-            <a:extLst>
-              <a:ext uri="{FF2B5EF4-FFF2-40B4-BE49-F238E27FC236}">
-                <a16:creationId xmlns:a16="http://schemas.microsoft.com/office/drawing/2014/main" id="{F7A090DE-BD2B-47FF-A170-5C99390278B2}"/>
-              </a:ext>
-            </a:extLst>
-          </p:cNvPr>
-          <p:cNvSpPr txBox="1"/>
-          <p:nvPr/>
-        </p:nvSpPr>
-        <p:spPr>
-          <a:xfrm>
-            <a:off x="9869556" y="5934670"/>
-            <a:ext cx="2544417" cy="923330"/>
-          </a:xfrm>
-          <a:prstGeom prst="rect">
-            <a:avLst/>
-          </a:prstGeom>
-          <a:solidFill>
-            <a:schemeClr val="accent4"/>
-          </a:solidFill>
-        </p:spPr>
-        <p:txBody>
-          <a:bodyPr wrap="square" rtlCol="0">
-            <a:spAutoFit/>
-          </a:bodyPr>
-          <a:lstStyle/>
-          <a:p>
-            <a:r>
-              <a:rPr lang="en-US" b="1" dirty="0"/>
-              <a:t>Above ground vegetation</a:t>
-            </a:r>
-            <a:r>
-              <a:rPr lang="en-US" dirty="0"/>
-              <a:t>: tall, perennial graminoids </a:t>
-            </a:r>
-          </a:p>
-        </p:txBody>
-      </p:sp>
+        </p:grpSpPr>
+        <p:pic>
+          <p:nvPicPr>
+            <p:cNvPr id="2" name="Picture 1">
+              <a:extLst>
+                <a:ext uri="{FF2B5EF4-FFF2-40B4-BE49-F238E27FC236}">
+                  <a16:creationId xmlns:a16="http://schemas.microsoft.com/office/drawing/2014/main" id="{D45A83D0-F052-4E25-88AA-E6A1221A9FFE}"/>
+                </a:ext>
+              </a:extLst>
+            </p:cNvPr>
+            <p:cNvPicPr>
+              <a:picLocks noChangeAspect="1"/>
+            </p:cNvPicPr>
+            <p:nvPr/>
+          </p:nvPicPr>
+          <p:blipFill>
+            <a:blip r:embed="rId2"/>
+            <a:stretch>
+              <a:fillRect/>
+            </a:stretch>
+          </p:blipFill>
+          <p:spPr>
+            <a:xfrm>
+              <a:off x="-71512" y="-9939"/>
+              <a:ext cx="4954085" cy="3438939"/>
+            </a:xfrm>
+            <a:prstGeom prst="rect">
+              <a:avLst/>
+            </a:prstGeom>
+          </p:spPr>
+        </p:pic>
+        <p:pic>
+          <p:nvPicPr>
+            <p:cNvPr id="3" name="Picture 2">
+              <a:extLst>
+                <a:ext uri="{FF2B5EF4-FFF2-40B4-BE49-F238E27FC236}">
+                  <a16:creationId xmlns:a16="http://schemas.microsoft.com/office/drawing/2014/main" id="{BAEF06C2-271F-475A-8C0B-ACFC4B4012BA}"/>
+                </a:ext>
+              </a:extLst>
+            </p:cNvPr>
+            <p:cNvPicPr>
+              <a:picLocks noChangeAspect="1"/>
+            </p:cNvPicPr>
+            <p:nvPr/>
+          </p:nvPicPr>
+          <p:blipFill>
+            <a:blip r:embed="rId3"/>
+            <a:stretch>
+              <a:fillRect/>
+            </a:stretch>
+          </p:blipFill>
+          <p:spPr>
+            <a:xfrm>
+              <a:off x="98977" y="3429000"/>
+              <a:ext cx="4857750" cy="600075"/>
+            </a:xfrm>
+            <a:prstGeom prst="rect">
+              <a:avLst/>
+            </a:prstGeom>
+          </p:spPr>
+        </p:pic>
+        <p:pic>
+          <p:nvPicPr>
+            <p:cNvPr id="4" name="Picture 3">
+              <a:extLst>
+                <a:ext uri="{FF2B5EF4-FFF2-40B4-BE49-F238E27FC236}">
+                  <a16:creationId xmlns:a16="http://schemas.microsoft.com/office/drawing/2014/main" id="{FFC51D9F-26F7-442B-853C-F22B7381B8D0}"/>
+                </a:ext>
+              </a:extLst>
+            </p:cNvPr>
+            <p:cNvPicPr>
+              <a:picLocks noChangeAspect="1"/>
+            </p:cNvPicPr>
+            <p:nvPr/>
+          </p:nvPicPr>
+          <p:blipFill>
+            <a:blip r:embed="rId4"/>
+            <a:stretch>
+              <a:fillRect/>
+            </a:stretch>
+          </p:blipFill>
+          <p:spPr>
+            <a:xfrm>
+              <a:off x="5791200" y="0"/>
+              <a:ext cx="6400800" cy="4210050"/>
+            </a:xfrm>
+            <a:prstGeom prst="rect">
+              <a:avLst/>
+            </a:prstGeom>
+          </p:spPr>
+        </p:pic>
+        <p:pic>
+          <p:nvPicPr>
+            <p:cNvPr id="5" name="Picture 4">
+              <a:extLst>
+                <a:ext uri="{FF2B5EF4-FFF2-40B4-BE49-F238E27FC236}">
+                  <a16:creationId xmlns:a16="http://schemas.microsoft.com/office/drawing/2014/main" id="{26470400-C662-460D-B54F-AC0F631CA8B0}"/>
+                </a:ext>
+              </a:extLst>
+            </p:cNvPr>
+            <p:cNvPicPr>
+              <a:picLocks noChangeAspect="1"/>
+            </p:cNvPicPr>
+            <p:nvPr/>
+          </p:nvPicPr>
+          <p:blipFill>
+            <a:blip r:embed="rId5"/>
+            <a:stretch>
+              <a:fillRect/>
+            </a:stretch>
+          </p:blipFill>
+          <p:spPr>
+            <a:xfrm>
+              <a:off x="6683651" y="4316067"/>
+              <a:ext cx="5438775" cy="1200150"/>
+            </a:xfrm>
+            <a:prstGeom prst="rect">
+              <a:avLst/>
+            </a:prstGeom>
+          </p:spPr>
+        </p:pic>
+        <p:sp>
+          <p:nvSpPr>
+            <p:cNvPr id="6" name="TextBox 5">
+              <a:extLst>
+                <a:ext uri="{FF2B5EF4-FFF2-40B4-BE49-F238E27FC236}">
+                  <a16:creationId xmlns:a16="http://schemas.microsoft.com/office/drawing/2014/main" id="{F7A090DE-BD2B-47FF-A170-5C99390278B2}"/>
+                </a:ext>
+              </a:extLst>
+            </p:cNvPr>
+            <p:cNvSpPr txBox="1"/>
+            <p:nvPr/>
+          </p:nvSpPr>
+          <p:spPr>
+            <a:xfrm>
+              <a:off x="1592721" y="4454477"/>
+              <a:ext cx="2544417" cy="923330"/>
+            </a:xfrm>
+            <a:prstGeom prst="rect">
+              <a:avLst/>
+            </a:prstGeom>
+            <a:solidFill>
+              <a:schemeClr val="accent4"/>
+            </a:solidFill>
+          </p:spPr>
+          <p:txBody>
+            <a:bodyPr wrap="square" rtlCol="0">
+              <a:spAutoFit/>
+            </a:bodyPr>
+            <a:lstStyle/>
+            <a:p>
+              <a:r>
+                <a:rPr lang="en-US" b="1" dirty="0"/>
+                <a:t>Above ground vegetation</a:t>
+              </a:r>
+              <a:r>
+                <a:rPr lang="en-US" dirty="0"/>
+                <a:t>: tall, perennial graminoids </a:t>
+              </a:r>
+            </a:p>
+          </p:txBody>
+        </p:sp>
+      </p:grpSp>
     </p:spTree>
     <p:extLst>
       <p:ext uri="{BB962C8B-B14F-4D97-AF65-F5344CB8AC3E}">
@@ -3934,167 +4144,188 @@
           <a:chExt cx="0" cy="0"/>
         </a:xfrm>
       </p:grpSpPr>
-      <p:pic>
-        <p:nvPicPr>
-          <p:cNvPr id="2" name="Picture 1">
-            <a:extLst>
-              <a:ext uri="{FF2B5EF4-FFF2-40B4-BE49-F238E27FC236}">
-                <a16:creationId xmlns:a16="http://schemas.microsoft.com/office/drawing/2014/main" id="{534C45FE-8466-4C28-B189-A80430D29A45}"/>
-              </a:ext>
-            </a:extLst>
-          </p:cNvPr>
-          <p:cNvPicPr>
-            <a:picLocks noChangeAspect="1"/>
-          </p:cNvPicPr>
+      <p:grpSp>
+        <p:nvGrpSpPr>
+          <p:cNvPr id="7" name="Group 6">
+            <a:extLst>
+              <a:ext uri="{FF2B5EF4-FFF2-40B4-BE49-F238E27FC236}">
+                <a16:creationId xmlns:a16="http://schemas.microsoft.com/office/drawing/2014/main" id="{1F614A4F-F183-4453-956D-5C454F6B0D4D}"/>
+              </a:ext>
+            </a:extLst>
+          </p:cNvPr>
+          <p:cNvGrpSpPr/>
           <p:nvPr/>
-        </p:nvPicPr>
-        <p:blipFill>
-          <a:blip r:embed="rId2"/>
-          <a:stretch>
-            <a:fillRect/>
-          </a:stretch>
-        </p:blipFill>
-        <p:spPr>
+        </p:nvGrpSpPr>
+        <p:grpSpPr>
           <a:xfrm>
             <a:off x="59615" y="0"/>
-            <a:ext cx="5059037" cy="3511793"/>
+            <a:ext cx="10389745" cy="6858000"/>
+            <a:chOff x="59615" y="0"/>
+            <a:chExt cx="10389745" cy="6858000"/>
           </a:xfrm>
-          <a:prstGeom prst="rect">
-            <a:avLst/>
-          </a:prstGeom>
-        </p:spPr>
-      </p:pic>
-      <p:pic>
-        <p:nvPicPr>
-          <p:cNvPr id="3" name="Picture 2">
-            <a:extLst>
-              <a:ext uri="{FF2B5EF4-FFF2-40B4-BE49-F238E27FC236}">
-                <a16:creationId xmlns:a16="http://schemas.microsoft.com/office/drawing/2014/main" id="{4B27D299-3F0C-4BDA-88AF-E4E16113DF29}"/>
-              </a:ext>
-            </a:extLst>
-          </p:cNvPr>
-          <p:cNvPicPr>
-            <a:picLocks noChangeAspect="1"/>
-          </p:cNvPicPr>
-          <p:nvPr/>
-        </p:nvPicPr>
-        <p:blipFill>
-          <a:blip r:embed="rId3"/>
-          <a:stretch>
-            <a:fillRect/>
-          </a:stretch>
-        </p:blipFill>
-        <p:spPr>
-          <a:xfrm>
-            <a:off x="5390322" y="0"/>
-            <a:ext cx="5059038" cy="3511794"/>
-          </a:xfrm>
-          <a:prstGeom prst="rect">
-            <a:avLst/>
-          </a:prstGeom>
-        </p:spPr>
-      </p:pic>
-      <p:pic>
-        <p:nvPicPr>
-          <p:cNvPr id="4" name="Picture 3">
-            <a:extLst>
-              <a:ext uri="{FF2B5EF4-FFF2-40B4-BE49-F238E27FC236}">
-                <a16:creationId xmlns:a16="http://schemas.microsoft.com/office/drawing/2014/main" id="{83AF3617-00C3-4BA7-B36B-8804D10CDCC2}"/>
-              </a:ext>
-            </a:extLst>
-          </p:cNvPr>
-          <p:cNvPicPr>
-            <a:picLocks noChangeAspect="1"/>
-          </p:cNvPicPr>
-          <p:nvPr/>
-        </p:nvPicPr>
-        <p:blipFill>
-          <a:blip r:embed="rId4"/>
-          <a:stretch>
-            <a:fillRect/>
-          </a:stretch>
-        </p:blipFill>
-        <p:spPr>
-          <a:xfrm>
-            <a:off x="331285" y="3534790"/>
-            <a:ext cx="4787367" cy="3323210"/>
-          </a:xfrm>
-          <a:prstGeom prst="rect">
-            <a:avLst/>
-          </a:prstGeom>
-        </p:spPr>
-      </p:pic>
-      <p:pic>
-        <p:nvPicPr>
-          <p:cNvPr id="5" name="Picture 4">
-            <a:extLst>
-              <a:ext uri="{FF2B5EF4-FFF2-40B4-BE49-F238E27FC236}">
-                <a16:creationId xmlns:a16="http://schemas.microsoft.com/office/drawing/2014/main" id="{BF619DD8-D4DB-4932-94DC-152FE0155334}"/>
-              </a:ext>
-            </a:extLst>
-          </p:cNvPr>
-          <p:cNvPicPr>
-            <a:picLocks noChangeAspect="1"/>
-          </p:cNvPicPr>
-          <p:nvPr/>
-        </p:nvPicPr>
-        <p:blipFill>
-          <a:blip r:embed="rId5"/>
-          <a:stretch>
-            <a:fillRect/>
-          </a:stretch>
-        </p:blipFill>
-        <p:spPr>
-          <a:xfrm>
-            <a:off x="5390322" y="3511793"/>
-            <a:ext cx="4674722" cy="3245016"/>
-          </a:xfrm>
-          <a:prstGeom prst="rect">
-            <a:avLst/>
-          </a:prstGeom>
-        </p:spPr>
-      </p:pic>
-      <p:sp>
-        <p:nvSpPr>
-          <p:cNvPr id="6" name="TextBox 5">
-            <a:extLst>
-              <a:ext uri="{FF2B5EF4-FFF2-40B4-BE49-F238E27FC236}">
-                <a16:creationId xmlns:a16="http://schemas.microsoft.com/office/drawing/2014/main" id="{E226B57D-4BF1-4F22-98BD-FD0307336F3A}"/>
-              </a:ext>
-            </a:extLst>
-          </p:cNvPr>
-          <p:cNvSpPr txBox="1"/>
-          <p:nvPr/>
-        </p:nvSpPr>
-        <p:spPr>
-          <a:xfrm>
-            <a:off x="9869556" y="5934670"/>
-            <a:ext cx="2544417" cy="923330"/>
-          </a:xfrm>
-          <a:prstGeom prst="rect">
-            <a:avLst/>
-          </a:prstGeom>
-          <a:solidFill>
-            <a:schemeClr val="accent4"/>
-          </a:solidFill>
-        </p:spPr>
-        <p:txBody>
-          <a:bodyPr wrap="square" rtlCol="0">
-            <a:spAutoFit/>
-          </a:bodyPr>
-          <a:lstStyle/>
-          <a:p>
-            <a:r>
-              <a:rPr lang="en-US" b="1" dirty="0"/>
-              <a:t>Above ground vegetation</a:t>
-            </a:r>
-            <a:r>
-              <a:rPr lang="en-US" dirty="0"/>
-              <a:t>: tall, perennial graminoids </a:t>
-            </a:r>
-          </a:p>
-        </p:txBody>
-      </p:sp>
+        </p:grpSpPr>
+        <p:pic>
+          <p:nvPicPr>
+            <p:cNvPr id="2" name="Picture 1">
+              <a:extLst>
+                <a:ext uri="{FF2B5EF4-FFF2-40B4-BE49-F238E27FC236}">
+                  <a16:creationId xmlns:a16="http://schemas.microsoft.com/office/drawing/2014/main" id="{534C45FE-8466-4C28-B189-A80430D29A45}"/>
+                </a:ext>
+              </a:extLst>
+            </p:cNvPr>
+            <p:cNvPicPr>
+              <a:picLocks noChangeAspect="1"/>
+            </p:cNvPicPr>
+            <p:nvPr/>
+          </p:nvPicPr>
+          <p:blipFill>
+            <a:blip r:embed="rId2"/>
+            <a:stretch>
+              <a:fillRect/>
+            </a:stretch>
+          </p:blipFill>
+          <p:spPr>
+            <a:xfrm>
+              <a:off x="59615" y="0"/>
+              <a:ext cx="5059037" cy="3511793"/>
+            </a:xfrm>
+            <a:prstGeom prst="rect">
+              <a:avLst/>
+            </a:prstGeom>
+          </p:spPr>
+        </p:pic>
+        <p:pic>
+          <p:nvPicPr>
+            <p:cNvPr id="3" name="Picture 2">
+              <a:extLst>
+                <a:ext uri="{FF2B5EF4-FFF2-40B4-BE49-F238E27FC236}">
+                  <a16:creationId xmlns:a16="http://schemas.microsoft.com/office/drawing/2014/main" id="{4B27D299-3F0C-4BDA-88AF-E4E16113DF29}"/>
+                </a:ext>
+              </a:extLst>
+            </p:cNvPr>
+            <p:cNvPicPr>
+              <a:picLocks noChangeAspect="1"/>
+            </p:cNvPicPr>
+            <p:nvPr/>
+          </p:nvPicPr>
+          <p:blipFill>
+            <a:blip r:embed="rId3"/>
+            <a:stretch>
+              <a:fillRect/>
+            </a:stretch>
+          </p:blipFill>
+          <p:spPr>
+            <a:xfrm>
+              <a:off x="5390322" y="0"/>
+              <a:ext cx="5059038" cy="3511794"/>
+            </a:xfrm>
+            <a:prstGeom prst="rect">
+              <a:avLst/>
+            </a:prstGeom>
+          </p:spPr>
+        </p:pic>
+        <p:pic>
+          <p:nvPicPr>
+            <p:cNvPr id="4" name="Picture 3">
+              <a:extLst>
+                <a:ext uri="{FF2B5EF4-FFF2-40B4-BE49-F238E27FC236}">
+                  <a16:creationId xmlns:a16="http://schemas.microsoft.com/office/drawing/2014/main" id="{83AF3617-00C3-4BA7-B36B-8804D10CDCC2}"/>
+                </a:ext>
+              </a:extLst>
+            </p:cNvPr>
+            <p:cNvPicPr>
+              <a:picLocks noChangeAspect="1"/>
+            </p:cNvPicPr>
+            <p:nvPr/>
+          </p:nvPicPr>
+          <p:blipFill>
+            <a:blip r:embed="rId4"/>
+            <a:stretch>
+              <a:fillRect/>
+            </a:stretch>
+          </p:blipFill>
+          <p:spPr>
+            <a:xfrm>
+              <a:off x="331285" y="3534790"/>
+              <a:ext cx="4787367" cy="3323210"/>
+            </a:xfrm>
+            <a:prstGeom prst="rect">
+              <a:avLst/>
+            </a:prstGeom>
+          </p:spPr>
+        </p:pic>
+        <p:pic>
+          <p:nvPicPr>
+            <p:cNvPr id="5" name="Picture 4">
+              <a:extLst>
+                <a:ext uri="{FF2B5EF4-FFF2-40B4-BE49-F238E27FC236}">
+                  <a16:creationId xmlns:a16="http://schemas.microsoft.com/office/drawing/2014/main" id="{BF619DD8-D4DB-4932-94DC-152FE0155334}"/>
+                </a:ext>
+              </a:extLst>
+            </p:cNvPr>
+            <p:cNvPicPr>
+              <a:picLocks noChangeAspect="1"/>
+            </p:cNvPicPr>
+            <p:nvPr/>
+          </p:nvPicPr>
+          <p:blipFill>
+            <a:blip r:embed="rId5"/>
+            <a:stretch>
+              <a:fillRect/>
+            </a:stretch>
+          </p:blipFill>
+          <p:spPr>
+            <a:xfrm>
+              <a:off x="5390322" y="3511793"/>
+              <a:ext cx="4674722" cy="3245016"/>
+            </a:xfrm>
+            <a:prstGeom prst="rect">
+              <a:avLst/>
+            </a:prstGeom>
+          </p:spPr>
+        </p:pic>
+        <p:sp>
+          <p:nvSpPr>
+            <p:cNvPr id="6" name="TextBox 5">
+              <a:extLst>
+                <a:ext uri="{FF2B5EF4-FFF2-40B4-BE49-F238E27FC236}">
+                  <a16:creationId xmlns:a16="http://schemas.microsoft.com/office/drawing/2014/main" id="{E226B57D-4BF1-4F22-98BD-FD0307336F3A}"/>
+                </a:ext>
+              </a:extLst>
+            </p:cNvPr>
+            <p:cNvSpPr txBox="1"/>
+            <p:nvPr/>
+          </p:nvSpPr>
+          <p:spPr>
+            <a:xfrm>
+              <a:off x="4273816" y="3167390"/>
+              <a:ext cx="2233012" cy="523220"/>
+            </a:xfrm>
+            <a:prstGeom prst="rect">
+              <a:avLst/>
+            </a:prstGeom>
+            <a:solidFill>
+              <a:schemeClr val="accent4"/>
+            </a:solidFill>
+          </p:spPr>
+          <p:txBody>
+            <a:bodyPr wrap="square" rtlCol="0">
+              <a:spAutoFit/>
+            </a:bodyPr>
+            <a:lstStyle/>
+            <a:p>
+              <a:r>
+                <a:rPr lang="en-US" sz="1400" b="1" dirty="0"/>
+                <a:t>Above ground vegetation</a:t>
+              </a:r>
+              <a:r>
+                <a:rPr lang="en-US" sz="1400" dirty="0"/>
+                <a:t>: tall, perennial graminoids </a:t>
+              </a:r>
+            </a:p>
+          </p:txBody>
+        </p:sp>
+      </p:grpSp>
     </p:spTree>
     <p:extLst>
       <p:ext uri="{BB962C8B-B14F-4D97-AF65-F5344CB8AC3E}">
@@ -4392,167 +4623,188 @@
           <a:chExt cx="0" cy="0"/>
         </a:xfrm>
       </p:grpSpPr>
-      <p:pic>
-        <p:nvPicPr>
-          <p:cNvPr id="2" name="Picture 1">
-            <a:extLst>
-              <a:ext uri="{FF2B5EF4-FFF2-40B4-BE49-F238E27FC236}">
-                <a16:creationId xmlns:a16="http://schemas.microsoft.com/office/drawing/2014/main" id="{00B30A66-ADED-4E5B-9B83-2932D91418BC}"/>
-              </a:ext>
-            </a:extLst>
-          </p:cNvPr>
-          <p:cNvPicPr>
-            <a:picLocks noChangeAspect="1"/>
-          </p:cNvPicPr>
+      <p:grpSp>
+        <p:nvGrpSpPr>
+          <p:cNvPr id="7" name="Group 6">
+            <a:extLst>
+              <a:ext uri="{FF2B5EF4-FFF2-40B4-BE49-F238E27FC236}">
+                <a16:creationId xmlns:a16="http://schemas.microsoft.com/office/drawing/2014/main" id="{A882132A-AFB4-4E3B-967F-DBAA1C395664}"/>
+              </a:ext>
+            </a:extLst>
+          </p:cNvPr>
+          <p:cNvGrpSpPr/>
           <p:nvPr/>
-        </p:nvPicPr>
-        <p:blipFill>
-          <a:blip r:embed="rId2"/>
-          <a:stretch>
-            <a:fillRect/>
-          </a:stretch>
-        </p:blipFill>
-        <p:spPr>
+        </p:nvGrpSpPr>
+        <p:grpSpPr>
           <a:xfrm>
-            <a:off x="82807" y="79513"/>
-            <a:ext cx="4825221" cy="3349487"/>
+            <a:off x="82807" y="7868"/>
+            <a:ext cx="12109193" cy="5487435"/>
+            <a:chOff x="82807" y="7868"/>
+            <a:chExt cx="12109193" cy="5487435"/>
           </a:xfrm>
-          <a:prstGeom prst="rect">
-            <a:avLst/>
-          </a:prstGeom>
-        </p:spPr>
-      </p:pic>
-      <p:pic>
-        <p:nvPicPr>
-          <p:cNvPr id="3" name="Picture 2">
-            <a:extLst>
-              <a:ext uri="{FF2B5EF4-FFF2-40B4-BE49-F238E27FC236}">
-                <a16:creationId xmlns:a16="http://schemas.microsoft.com/office/drawing/2014/main" id="{3D6E26F4-7D92-45F9-A180-9F430BD1E645}"/>
-              </a:ext>
-            </a:extLst>
-          </p:cNvPr>
-          <p:cNvPicPr>
-            <a:picLocks noChangeAspect="1"/>
-          </p:cNvPicPr>
-          <p:nvPr/>
-        </p:nvPicPr>
-        <p:blipFill>
-          <a:blip r:embed="rId3"/>
-          <a:stretch>
-            <a:fillRect/>
-          </a:stretch>
-        </p:blipFill>
-        <p:spPr>
-          <a:xfrm>
-            <a:off x="202678" y="3532118"/>
-            <a:ext cx="4705350" cy="628650"/>
-          </a:xfrm>
-          <a:prstGeom prst="rect">
-            <a:avLst/>
-          </a:prstGeom>
-        </p:spPr>
-      </p:pic>
-      <p:pic>
-        <p:nvPicPr>
-          <p:cNvPr id="4" name="Picture 3">
-            <a:extLst>
-              <a:ext uri="{FF2B5EF4-FFF2-40B4-BE49-F238E27FC236}">
-                <a16:creationId xmlns:a16="http://schemas.microsoft.com/office/drawing/2014/main" id="{E2FCFD61-B800-437F-A098-3030E721C94E}"/>
-              </a:ext>
-            </a:extLst>
-          </p:cNvPr>
-          <p:cNvPicPr>
-            <a:picLocks noChangeAspect="1"/>
-          </p:cNvPicPr>
-          <p:nvPr/>
-        </p:nvPicPr>
-        <p:blipFill>
-          <a:blip r:embed="rId4"/>
-          <a:stretch>
-            <a:fillRect/>
-          </a:stretch>
-        </p:blipFill>
-        <p:spPr>
-          <a:xfrm>
-            <a:off x="5734050" y="7868"/>
-            <a:ext cx="6457950" cy="4152900"/>
-          </a:xfrm>
-          <a:prstGeom prst="rect">
-            <a:avLst/>
-          </a:prstGeom>
-        </p:spPr>
-      </p:pic>
-      <p:pic>
-        <p:nvPicPr>
-          <p:cNvPr id="5" name="Picture 4">
-            <a:extLst>
-              <a:ext uri="{FF2B5EF4-FFF2-40B4-BE49-F238E27FC236}">
-                <a16:creationId xmlns:a16="http://schemas.microsoft.com/office/drawing/2014/main" id="{1AFC3578-3E3D-48A6-8748-D7FFA74E1862}"/>
-              </a:ext>
-            </a:extLst>
-          </p:cNvPr>
-          <p:cNvPicPr>
-            <a:picLocks noChangeAspect="1"/>
-          </p:cNvPicPr>
-          <p:nvPr/>
-        </p:nvPicPr>
-        <p:blipFill>
-          <a:blip r:embed="rId5"/>
-          <a:stretch>
-            <a:fillRect/>
-          </a:stretch>
-        </p:blipFill>
-        <p:spPr>
-          <a:xfrm>
-            <a:off x="6724650" y="4304678"/>
-            <a:ext cx="5467350" cy="1190625"/>
-          </a:xfrm>
-          <a:prstGeom prst="rect">
-            <a:avLst/>
-          </a:prstGeom>
-        </p:spPr>
-      </p:pic>
-      <p:sp>
-        <p:nvSpPr>
-          <p:cNvPr id="6" name="TextBox 5">
-            <a:extLst>
-              <a:ext uri="{FF2B5EF4-FFF2-40B4-BE49-F238E27FC236}">
-                <a16:creationId xmlns:a16="http://schemas.microsoft.com/office/drawing/2014/main" id="{9439C708-CAB7-4DE2-AE75-07E8F62C7B33}"/>
-              </a:ext>
-            </a:extLst>
-          </p:cNvPr>
-          <p:cNvSpPr txBox="1"/>
-          <p:nvPr/>
-        </p:nvSpPr>
-        <p:spPr>
-          <a:xfrm>
-            <a:off x="9750286" y="6103635"/>
-            <a:ext cx="2544417" cy="646331"/>
-          </a:xfrm>
-          <a:prstGeom prst="rect">
-            <a:avLst/>
-          </a:prstGeom>
-          <a:solidFill>
-            <a:schemeClr val="accent4"/>
-          </a:solidFill>
-        </p:spPr>
-        <p:txBody>
-          <a:bodyPr wrap="square" rtlCol="0">
-            <a:spAutoFit/>
-          </a:bodyPr>
-          <a:lstStyle/>
-          <a:p>
-            <a:r>
-              <a:rPr lang="en-US" b="1" dirty="0"/>
-              <a:t>Surface seed bank</a:t>
-            </a:r>
-            <a:r>
-              <a:rPr lang="en-US" dirty="0"/>
-              <a:t>: tall, perennial graminoids </a:t>
-            </a:r>
-          </a:p>
-        </p:txBody>
-      </p:sp>
+        </p:grpSpPr>
+        <p:pic>
+          <p:nvPicPr>
+            <p:cNvPr id="2" name="Picture 1">
+              <a:extLst>
+                <a:ext uri="{FF2B5EF4-FFF2-40B4-BE49-F238E27FC236}">
+                  <a16:creationId xmlns:a16="http://schemas.microsoft.com/office/drawing/2014/main" id="{00B30A66-ADED-4E5B-9B83-2932D91418BC}"/>
+                </a:ext>
+              </a:extLst>
+            </p:cNvPr>
+            <p:cNvPicPr>
+              <a:picLocks noChangeAspect="1"/>
+            </p:cNvPicPr>
+            <p:nvPr/>
+          </p:nvPicPr>
+          <p:blipFill>
+            <a:blip r:embed="rId2"/>
+            <a:stretch>
+              <a:fillRect/>
+            </a:stretch>
+          </p:blipFill>
+          <p:spPr>
+            <a:xfrm>
+              <a:off x="82807" y="79513"/>
+              <a:ext cx="4825221" cy="3349487"/>
+            </a:xfrm>
+            <a:prstGeom prst="rect">
+              <a:avLst/>
+            </a:prstGeom>
+          </p:spPr>
+        </p:pic>
+        <p:pic>
+          <p:nvPicPr>
+            <p:cNvPr id="3" name="Picture 2">
+              <a:extLst>
+                <a:ext uri="{FF2B5EF4-FFF2-40B4-BE49-F238E27FC236}">
+                  <a16:creationId xmlns:a16="http://schemas.microsoft.com/office/drawing/2014/main" id="{3D6E26F4-7D92-45F9-A180-9F430BD1E645}"/>
+                </a:ext>
+              </a:extLst>
+            </p:cNvPr>
+            <p:cNvPicPr>
+              <a:picLocks noChangeAspect="1"/>
+            </p:cNvPicPr>
+            <p:nvPr/>
+          </p:nvPicPr>
+          <p:blipFill>
+            <a:blip r:embed="rId3"/>
+            <a:stretch>
+              <a:fillRect/>
+            </a:stretch>
+          </p:blipFill>
+          <p:spPr>
+            <a:xfrm>
+              <a:off x="202678" y="3532118"/>
+              <a:ext cx="4705350" cy="628650"/>
+            </a:xfrm>
+            <a:prstGeom prst="rect">
+              <a:avLst/>
+            </a:prstGeom>
+          </p:spPr>
+        </p:pic>
+        <p:pic>
+          <p:nvPicPr>
+            <p:cNvPr id="4" name="Picture 3">
+              <a:extLst>
+                <a:ext uri="{FF2B5EF4-FFF2-40B4-BE49-F238E27FC236}">
+                  <a16:creationId xmlns:a16="http://schemas.microsoft.com/office/drawing/2014/main" id="{E2FCFD61-B800-437F-A098-3030E721C94E}"/>
+                </a:ext>
+              </a:extLst>
+            </p:cNvPr>
+            <p:cNvPicPr>
+              <a:picLocks noChangeAspect="1"/>
+            </p:cNvPicPr>
+            <p:nvPr/>
+          </p:nvPicPr>
+          <p:blipFill>
+            <a:blip r:embed="rId4"/>
+            <a:stretch>
+              <a:fillRect/>
+            </a:stretch>
+          </p:blipFill>
+          <p:spPr>
+            <a:xfrm>
+              <a:off x="5734050" y="7868"/>
+              <a:ext cx="6457950" cy="4152900"/>
+            </a:xfrm>
+            <a:prstGeom prst="rect">
+              <a:avLst/>
+            </a:prstGeom>
+          </p:spPr>
+        </p:pic>
+        <p:pic>
+          <p:nvPicPr>
+            <p:cNvPr id="5" name="Picture 4">
+              <a:extLst>
+                <a:ext uri="{FF2B5EF4-FFF2-40B4-BE49-F238E27FC236}">
+                  <a16:creationId xmlns:a16="http://schemas.microsoft.com/office/drawing/2014/main" id="{1AFC3578-3E3D-48A6-8748-D7FFA74E1862}"/>
+                </a:ext>
+              </a:extLst>
+            </p:cNvPr>
+            <p:cNvPicPr>
+              <a:picLocks noChangeAspect="1"/>
+            </p:cNvPicPr>
+            <p:nvPr/>
+          </p:nvPicPr>
+          <p:blipFill>
+            <a:blip r:embed="rId5"/>
+            <a:stretch>
+              <a:fillRect/>
+            </a:stretch>
+          </p:blipFill>
+          <p:spPr>
+            <a:xfrm>
+              <a:off x="6724650" y="4304678"/>
+              <a:ext cx="5467350" cy="1190625"/>
+            </a:xfrm>
+            <a:prstGeom prst="rect">
+              <a:avLst/>
+            </a:prstGeom>
+          </p:spPr>
+        </p:pic>
+        <p:sp>
+          <p:nvSpPr>
+            <p:cNvPr id="6" name="TextBox 5">
+              <a:extLst>
+                <a:ext uri="{FF2B5EF4-FFF2-40B4-BE49-F238E27FC236}">
+                  <a16:creationId xmlns:a16="http://schemas.microsoft.com/office/drawing/2014/main" id="{9439C708-CAB7-4DE2-AE75-07E8F62C7B33}"/>
+                </a:ext>
+              </a:extLst>
+            </p:cNvPr>
+            <p:cNvSpPr txBox="1"/>
+            <p:nvPr/>
+          </p:nvSpPr>
+          <p:spPr>
+            <a:xfrm>
+              <a:off x="2363611" y="4576824"/>
+              <a:ext cx="2544417" cy="646331"/>
+            </a:xfrm>
+            <a:prstGeom prst="rect">
+              <a:avLst/>
+            </a:prstGeom>
+            <a:solidFill>
+              <a:schemeClr val="accent4"/>
+            </a:solidFill>
+          </p:spPr>
+          <p:txBody>
+            <a:bodyPr wrap="square" rtlCol="0">
+              <a:spAutoFit/>
+            </a:bodyPr>
+            <a:lstStyle/>
+            <a:p>
+              <a:r>
+                <a:rPr lang="en-US" b="1" dirty="0"/>
+                <a:t>Surface seed bank</a:t>
+              </a:r>
+              <a:r>
+                <a:rPr lang="en-US" dirty="0"/>
+                <a:t>: tall, perennial graminoids </a:t>
+              </a:r>
+            </a:p>
+          </p:txBody>
+        </p:sp>
+      </p:grpSp>
     </p:spTree>
     <p:extLst>
       <p:ext uri="{BB962C8B-B14F-4D97-AF65-F5344CB8AC3E}">
@@ -4717,8 +4969,8 @@
         </p:nvSpPr>
         <p:spPr>
           <a:xfrm>
-            <a:off x="9750286" y="6103635"/>
-            <a:ext cx="2544417" cy="646331"/>
+            <a:off x="3961517" y="3167390"/>
+            <a:ext cx="1970745" cy="523220"/>
           </a:xfrm>
           <a:prstGeom prst="rect">
             <a:avLst/>
@@ -4734,11 +4986,11 @@
           <a:lstStyle/>
           <a:p>
             <a:r>
-              <a:rPr lang="en-US" b="1" dirty="0"/>
+              <a:rPr lang="en-US" sz="1400" b="1" dirty="0"/>
               <a:t>Surface seed bank</a:t>
             </a:r>
             <a:r>
-              <a:rPr lang="en-US" dirty="0"/>
+              <a:rPr lang="en-US" sz="1400" dirty="0"/>
               <a:t>: tall, perennial graminoids </a:t>
             </a:r>
           </a:p>
@@ -5861,6 +6113,15 @@
 </file>
 
 <file path=customXml/item2.xml><?xml version="1.0" encoding="utf-8"?>
+<?mso-contentType ?>
+<FormTemplates xmlns="http://schemas.microsoft.com/sharepoint/v3/contenttype/forms">
+  <Display>DocumentLibraryForm</Display>
+  <Edit>DocumentLibraryForm</Edit>
+  <New>DocumentLibraryForm</New>
+</FormTemplates>
+</file>
+
+<file path=customXml/item3.xml><?xml version="1.0" encoding="utf-8"?>
 <ct:contentTypeSchema xmlns:ct="http://schemas.microsoft.com/office/2006/metadata/contentType" xmlns:ma="http://schemas.microsoft.com/office/2006/metadata/properties/metaAttributes" ct:_="" ma:_="" ma:contentTypeName="Document" ma:contentTypeID="0x010100483727557648AA40B029C215891F95C5" ma:contentTypeVersion="14" ma:contentTypeDescription="Create a new document." ma:contentTypeScope="" ma:versionID="d36f379eec1cf084072dcf956aecbcf8">
   <xsd:schema xmlns:xsd="http://www.w3.org/2001/XMLSchema" xmlns:xs="http://www.w3.org/2001/XMLSchema" xmlns:p="http://schemas.microsoft.com/office/2006/metadata/properties" xmlns:ns3="8c008993-a31f-4b40-b1f3-88dd9c6e1924" xmlns:ns4="360018dd-41eb-4458-b1d4-4b46a95a2b02" targetNamespace="http://schemas.microsoft.com/office/2006/metadata/properties" ma:root="true" ma:fieldsID="bd1f472f1ef3281fe4dbeb8213942d38" ns3:_="" ns4:_="">
     <xsd:import namespace="8c008993-a31f-4b40-b1f3-88dd9c6e1924"/>
@@ -6089,33 +6350,32 @@
 </ct:contentTypeSchema>
 </file>
 
-<file path=customXml/item3.xml><?xml version="1.0" encoding="utf-8"?>
-<?mso-contentType ?>
-<FormTemplates xmlns="http://schemas.microsoft.com/sharepoint/v3/contenttype/forms">
-  <Display>DocumentLibraryForm</Display>
-  <Edit>DocumentLibraryForm</Edit>
-  <New>DocumentLibraryForm</New>
-</FormTemplates>
-</file>
-
 <file path=customXml/itemProps1.xml><?xml version="1.0" encoding="utf-8"?>
 <ds:datastoreItem xmlns:ds="http://schemas.openxmlformats.org/officeDocument/2006/customXml" ds:itemID="{10F6163B-152D-4FBB-A53A-C9E6E87DB3DC}">
   <ds:schemaRefs>
+    <ds:schemaRef ds:uri="360018dd-41eb-4458-b1d4-4b46a95a2b02"/>
+    <ds:schemaRef ds:uri="http://www.w3.org/XML/1998/namespace"/>
+    <ds:schemaRef ds:uri="http://schemas.openxmlformats.org/package/2006/metadata/core-properties"/>
+    <ds:schemaRef ds:uri="http://purl.org/dc/dcmitype/"/>
+    <ds:schemaRef ds:uri="8c008993-a31f-4b40-b1f3-88dd9c6e1924"/>
+    <ds:schemaRef ds:uri="http://purl.org/dc/terms/"/>
+    <ds:schemaRef ds:uri="http://schemas.microsoft.com/office/2006/documentManagement/types"/>
+    <ds:schemaRef ds:uri="http://schemas.microsoft.com/office/infopath/2007/PartnerControls"/>
+    <ds:schemaRef ds:uri="http://schemas.microsoft.com/office/2006/metadata/properties"/>
     <ds:schemaRef ds:uri="http://purl.org/dc/elements/1.1/"/>
-    <ds:schemaRef ds:uri="http://purl.org/dc/dcmitype/"/>
-    <ds:schemaRef ds:uri="http://www.w3.org/XML/1998/namespace"/>
-    <ds:schemaRef ds:uri="http://schemas.microsoft.com/office/2006/documentManagement/types"/>
-    <ds:schemaRef ds:uri="http://purl.org/dc/terms/"/>
-    <ds:schemaRef ds:uri="http://schemas.microsoft.com/office/2006/metadata/properties"/>
-    <ds:schemaRef ds:uri="http://schemas.microsoft.com/office/infopath/2007/PartnerControls"/>
-    <ds:schemaRef ds:uri="http://schemas.openxmlformats.org/package/2006/metadata/core-properties"/>
-    <ds:schemaRef ds:uri="360018dd-41eb-4458-b1d4-4b46a95a2b02"/>
-    <ds:schemaRef ds:uri="8c008993-a31f-4b40-b1f3-88dd9c6e1924"/>
   </ds:schemaRefs>
 </ds:datastoreItem>
 </file>
 
 <file path=customXml/itemProps2.xml><?xml version="1.0" encoding="utf-8"?>
+<ds:datastoreItem xmlns:ds="http://schemas.openxmlformats.org/officeDocument/2006/customXml" ds:itemID="{936EF84A-8CAE-4391-8991-945D21A56A65}">
+  <ds:schemaRefs>
+    <ds:schemaRef ds:uri="http://schemas.microsoft.com/sharepoint/v3/contenttype/forms"/>
+  </ds:schemaRefs>
+</ds:datastoreItem>
+</file>
+
+<file path=customXml/itemProps3.xml><?xml version="1.0" encoding="utf-8"?>
 <ds:datastoreItem xmlns:ds="http://schemas.openxmlformats.org/officeDocument/2006/customXml" ds:itemID="{05D33C84-E14B-40CB-BA88-93037D12400D}">
   <ds:schemaRefs>
     <ds:schemaRef ds:uri="http://schemas.microsoft.com/office/2006/metadata/contentType"/>
@@ -6132,12 +6392,4 @@
     <ds:schemaRef ds:uri="http://schemas.microsoft.com/internal/obd"/>
   </ds:schemaRefs>
 </ds:datastoreItem>
-</file>
-
-<file path=customXml/itemProps3.xml><?xml version="1.0" encoding="utf-8"?>
-<ds:datastoreItem xmlns:ds="http://schemas.openxmlformats.org/officeDocument/2006/customXml" ds:itemID="{936EF84A-8CAE-4391-8991-945D21A56A65}">
-  <ds:schemaRefs>
-    <ds:schemaRef ds:uri="http://schemas.microsoft.com/sharepoint/v3/contenttype/forms"/>
-  </ds:schemaRefs>
-</ds:datastoreItem>
 </file>
</xml_diff>